<commit_message>
Fechamento da versão 2
</commit_message>
<xml_diff>
--- a/[promo]/HowTo.pptx
+++ b/[promo]/HowTo.pptx
@@ -3,15 +3,16 @@
 <p:presentation xmlns:a="http://schemas.openxmlformats.org/drawingml/2006/main" xmlns:p="http://schemas.openxmlformats.org/presentationml/2006/main" xmlns:r="http://schemas.openxmlformats.org/officeDocument/2006/relationships">
   <p:sldMasterIdLst>
     <p:sldMasterId id="2147483648" r:id="rId2"/>
+    <p:sldMasterId id="2147483661" r:id="rId3"/>
   </p:sldMasterIdLst>
   <p:sldIdLst>
-    <p:sldId id="256" r:id="rId3"/>
-    <p:sldId id="257" r:id="rId4"/>
-    <p:sldId id="258" r:id="rId5"/>
-    <p:sldId id="259" r:id="rId6"/>
-    <p:sldId id="260" r:id="rId7"/>
-    <p:sldId id="261" r:id="rId8"/>
-    <p:sldId id="262" r:id="rId9"/>
+    <p:sldId id="256" r:id="rId4"/>
+    <p:sldId id="257" r:id="rId5"/>
+    <p:sldId id="258" r:id="rId6"/>
+    <p:sldId id="259" r:id="rId7"/>
+    <p:sldId id="260" r:id="rId8"/>
+    <p:sldId id="261" r:id="rId9"/>
+    <p:sldId id="262" r:id="rId10"/>
   </p:sldIdLst>
   <p:sldSz cx="10080625" cy="7559675"/>
   <p:notesSz cx="7772400" cy="10058400"/>
@@ -59,7 +60,7 @@
       </p:grpSpPr>
       <p:sp>
         <p:nvSpPr>
-          <p:cNvPr id="26" name="PlaceHolder 1"/>
+          <p:cNvPr id="23" name="PlaceHolder 1"/>
           <p:cNvSpPr>
             <a:spLocks noGrp="1"/>
           </p:cNvSpPr>
@@ -70,7 +71,7 @@
         <p:spPr>
           <a:xfrm>
             <a:off x="504000" y="301320"/>
-            <a:ext cx="9071640" cy="1262160"/>
+            <a:ext cx="9072000" cy="1261800"/>
           </a:xfrm>
           <a:prstGeom prst="rect">
             <a:avLst/>
@@ -86,7 +87,7 @@
       </p:sp>
       <p:sp>
         <p:nvSpPr>
-          <p:cNvPr id="27" name="PlaceHolder 2"/>
+          <p:cNvPr id="24" name="PlaceHolder 2"/>
           <p:cNvSpPr>
             <a:spLocks noGrp="1"/>
           </p:cNvSpPr>
@@ -96,8 +97,8 @@
         </p:nvSpPr>
         <p:spPr>
           <a:xfrm>
-            <a:off x="504000" y="1769040"/>
-            <a:ext cx="9071640" cy="2091240"/>
+            <a:off x="504000" y="1768680"/>
+            <a:ext cx="9072000" cy="2090880"/>
           </a:xfrm>
           <a:prstGeom prst="rect">
             <a:avLst/>
@@ -112,7 +113,7 @@
       </p:sp>
       <p:sp>
         <p:nvSpPr>
-          <p:cNvPr id="28" name="PlaceHolder 3"/>
+          <p:cNvPr id="25" name="PlaceHolder 3"/>
           <p:cNvSpPr>
             <a:spLocks noGrp="1"/>
           </p:cNvSpPr>
@@ -122,8 +123,8 @@
         </p:nvSpPr>
         <p:spPr>
           <a:xfrm>
-            <a:off x="504000" y="4059360"/>
-            <a:ext cx="9071640" cy="2091240"/>
+            <a:off x="504000" y="4058640"/>
+            <a:ext cx="9072000" cy="2090880"/>
           </a:xfrm>
           <a:prstGeom prst="rect">
             <a:avLst/>
@@ -160,7 +161,7 @@
       </p:grpSpPr>
       <p:sp>
         <p:nvSpPr>
-          <p:cNvPr id="29" name="PlaceHolder 1"/>
+          <p:cNvPr id="26" name="PlaceHolder 1"/>
           <p:cNvSpPr>
             <a:spLocks noGrp="1"/>
           </p:cNvSpPr>
@@ -171,7 +172,7 @@
         <p:spPr>
           <a:xfrm>
             <a:off x="504000" y="301320"/>
-            <a:ext cx="9071640" cy="1262160"/>
+            <a:ext cx="9072000" cy="1261800"/>
           </a:xfrm>
           <a:prstGeom prst="rect">
             <a:avLst/>
@@ -187,7 +188,7 @@
       </p:sp>
       <p:sp>
         <p:nvSpPr>
-          <p:cNvPr id="30" name="PlaceHolder 2"/>
+          <p:cNvPr id="27" name="PlaceHolder 2"/>
           <p:cNvSpPr>
             <a:spLocks noGrp="1"/>
           </p:cNvSpPr>
@@ -197,8 +198,8 @@
         </p:nvSpPr>
         <p:spPr>
           <a:xfrm>
-            <a:off x="504000" y="1769040"/>
-            <a:ext cx="4426920" cy="2091240"/>
+            <a:off x="504000" y="1768680"/>
+            <a:ext cx="4426920" cy="2090880"/>
           </a:xfrm>
           <a:prstGeom prst="rect">
             <a:avLst/>
@@ -213,7 +214,7 @@
       </p:sp>
       <p:sp>
         <p:nvSpPr>
-          <p:cNvPr id="31" name="PlaceHolder 3"/>
+          <p:cNvPr id="28" name="PlaceHolder 3"/>
           <p:cNvSpPr>
             <a:spLocks noGrp="1"/>
           </p:cNvSpPr>
@@ -223,8 +224,8 @@
         </p:nvSpPr>
         <p:spPr>
           <a:xfrm>
-            <a:off x="5152680" y="1769040"/>
-            <a:ext cx="4426920" cy="2091240"/>
+            <a:off x="5152680" y="1768680"/>
+            <a:ext cx="4426920" cy="2090880"/>
           </a:xfrm>
           <a:prstGeom prst="rect">
             <a:avLst/>
@@ -239,7 +240,7 @@
       </p:sp>
       <p:sp>
         <p:nvSpPr>
-          <p:cNvPr id="32" name="PlaceHolder 4"/>
+          <p:cNvPr id="29" name="PlaceHolder 4"/>
           <p:cNvSpPr>
             <a:spLocks noGrp="1"/>
           </p:cNvSpPr>
@@ -249,8 +250,8 @@
         </p:nvSpPr>
         <p:spPr>
           <a:xfrm>
-            <a:off x="5152680" y="4059360"/>
-            <a:ext cx="4426920" cy="2091240"/>
+            <a:off x="5152680" y="4058640"/>
+            <a:ext cx="4426920" cy="2090880"/>
           </a:xfrm>
           <a:prstGeom prst="rect">
             <a:avLst/>
@@ -265,7 +266,7 @@
       </p:sp>
       <p:sp>
         <p:nvSpPr>
-          <p:cNvPr id="33" name="PlaceHolder 5"/>
+          <p:cNvPr id="30" name="PlaceHolder 5"/>
           <p:cNvSpPr>
             <a:spLocks noGrp="1"/>
           </p:cNvSpPr>
@@ -275,8 +276,8 @@
         </p:nvSpPr>
         <p:spPr>
           <a:xfrm>
-            <a:off x="504000" y="4059360"/>
-            <a:ext cx="4426920" cy="2091240"/>
+            <a:off x="504000" y="4058640"/>
+            <a:ext cx="4426920" cy="2090880"/>
           </a:xfrm>
           <a:prstGeom prst="rect">
             <a:avLst/>
@@ -313,7 +314,7 @@
       </p:grpSpPr>
       <p:sp>
         <p:nvSpPr>
-          <p:cNvPr id="34" name="PlaceHolder 1"/>
+          <p:cNvPr id="31" name="PlaceHolder 1"/>
           <p:cNvSpPr>
             <a:spLocks noGrp="1"/>
           </p:cNvSpPr>
@@ -324,7 +325,7 @@
         <p:spPr>
           <a:xfrm>
             <a:off x="504000" y="301320"/>
-            <a:ext cx="9071640" cy="1262160"/>
+            <a:ext cx="9072000" cy="1261800"/>
           </a:xfrm>
           <a:prstGeom prst="rect">
             <a:avLst/>
@@ -340,7 +341,7 @@
       </p:sp>
       <p:sp>
         <p:nvSpPr>
-          <p:cNvPr id="35" name="PlaceHolder 2"/>
+          <p:cNvPr id="32" name="PlaceHolder 2"/>
           <p:cNvSpPr>
             <a:spLocks noGrp="1"/>
           </p:cNvSpPr>
@@ -350,8 +351,8 @@
         </p:nvSpPr>
         <p:spPr>
           <a:xfrm>
-            <a:off x="504000" y="1769040"/>
-            <a:ext cx="9071640" cy="4384440"/>
+            <a:off x="504000" y="1768680"/>
+            <a:ext cx="9072000" cy="4384080"/>
           </a:xfrm>
           <a:prstGeom prst="rect">
             <a:avLst/>
@@ -366,7 +367,7 @@
       </p:sp>
       <p:sp>
         <p:nvSpPr>
-          <p:cNvPr id="36" name="PlaceHolder 3"/>
+          <p:cNvPr id="33" name="PlaceHolder 3"/>
           <p:cNvSpPr>
             <a:spLocks noGrp="1"/>
           </p:cNvSpPr>
@@ -376,8 +377,8 @@
         </p:nvSpPr>
         <p:spPr>
           <a:xfrm>
-            <a:off x="504000" y="1769040"/>
-            <a:ext cx="9071640" cy="4384440"/>
+            <a:off x="504000" y="1768680"/>
+            <a:ext cx="9072000" cy="4384080"/>
           </a:xfrm>
           <a:prstGeom prst="rect">
             <a:avLst/>
@@ -392,7 +393,7 @@
       </p:sp>
       <p:pic>
         <p:nvPicPr>
-          <p:cNvPr id="37" name="" descr=""/>
+          <p:cNvPr id="34" name="" descr=""/>
           <p:cNvPicPr/>
           <p:nvPr/>
         </p:nvPicPr>
@@ -402,8 +403,8 @@
         </p:blipFill>
         <p:spPr>
           <a:xfrm>
-            <a:off x="2292120" y="1768680"/>
-            <a:ext cx="5495040" cy="4384440"/>
+            <a:off x="2292480" y="1768680"/>
+            <a:ext cx="5494680" cy="4384080"/>
           </a:xfrm>
           <a:prstGeom prst="rect">
             <a:avLst/>
@@ -415,7 +416,7 @@
       </p:pic>
       <p:pic>
         <p:nvPicPr>
-          <p:cNvPr id="38" name="" descr=""/>
+          <p:cNvPr id="35" name="" descr=""/>
           <p:cNvPicPr/>
           <p:nvPr/>
         </p:nvPicPr>
@@ -425,8 +426,8 @@
         </p:blipFill>
         <p:spPr>
           <a:xfrm>
-            <a:off x="2292120" y="1768680"/>
-            <a:ext cx="5495040" cy="4384440"/>
+            <a:off x="2292480" y="1768680"/>
+            <a:ext cx="5494680" cy="4384080"/>
           </a:xfrm>
           <a:prstGeom prst="rect">
             <a:avLst/>
@@ -436,6 +437,505 @@
           </a:ln>
         </p:spPr>
       </p:pic>
+    </p:spTree>
+  </p:cSld>
+</p:sldLayout>
+</file>
+
+<file path=ppt/slideLayouts/slideLayout13.xml><?xml version="1.0" encoding="utf-8"?>
+<p:sldLayout xmlns:a="http://schemas.openxmlformats.org/drawingml/2006/main" xmlns:p="http://schemas.openxmlformats.org/presentationml/2006/main" xmlns:r="http://schemas.openxmlformats.org/officeDocument/2006/relationships" type="blank" preserve="1">
+  <p:cSld name="Blank Slide">
+    <p:spTree>
+      <p:nvGrpSpPr>
+        <p:cNvPr id="1" name=""/>
+        <p:cNvGrpSpPr/>
+        <p:nvPr/>
+      </p:nvGrpSpPr>
+      <p:grpSpPr>
+        <a:xfrm>
+          <a:off x="0" y="0"/>
+          <a:ext cx="0" cy="0"/>
+          <a:chOff x="0" y="0"/>
+          <a:chExt cx="0" cy="0"/>
+        </a:xfrm>
+      </p:grpSpPr>
+    </p:spTree>
+  </p:cSld>
+</p:sldLayout>
+</file>
+
+<file path=ppt/slideLayouts/slideLayout14.xml><?xml version="1.0" encoding="utf-8"?>
+<p:sldLayout xmlns:a="http://schemas.openxmlformats.org/drawingml/2006/main" xmlns:p="http://schemas.openxmlformats.org/presentationml/2006/main" xmlns:r="http://schemas.openxmlformats.org/officeDocument/2006/relationships" type="tx" preserve="1">
+  <p:cSld name="Title Slide">
+    <p:spTree>
+      <p:nvGrpSpPr>
+        <p:cNvPr id="1" name=""/>
+        <p:cNvGrpSpPr/>
+        <p:nvPr/>
+      </p:nvGrpSpPr>
+      <p:grpSpPr>
+        <a:xfrm>
+          <a:off x="0" y="0"/>
+          <a:ext cx="0" cy="0"/>
+          <a:chOff x="0" y="0"/>
+          <a:chExt cx="0" cy="0"/>
+        </a:xfrm>
+      </p:grpSpPr>
+      <p:sp>
+        <p:nvSpPr>
+          <p:cNvPr id="38" name="PlaceHolder 1"/>
+          <p:cNvSpPr>
+            <a:spLocks noGrp="1"/>
+          </p:cNvSpPr>
+          <p:nvPr>
+            <p:ph type="title"/>
+          </p:nvPr>
+        </p:nvSpPr>
+        <p:spPr>
+          <a:xfrm>
+            <a:off x="504000" y="301320"/>
+            <a:ext cx="9072000" cy="1261800"/>
+          </a:xfrm>
+          <a:prstGeom prst="rect">
+            <a:avLst/>
+          </a:prstGeom>
+        </p:spPr>
+        <p:txBody>
+          <a:bodyPr lIns="0" rIns="0" tIns="0" bIns="0" anchor="ctr"/>
+          <a:p>
+            <a:pPr algn="ctr"/>
+            <a:endParaRPr/>
+          </a:p>
+        </p:txBody>
+      </p:sp>
+      <p:sp>
+        <p:nvSpPr>
+          <p:cNvPr id="39" name="PlaceHolder 2"/>
+          <p:cNvSpPr>
+            <a:spLocks noGrp="1"/>
+          </p:cNvSpPr>
+          <p:nvPr>
+            <p:ph type="subTitle"/>
+          </p:nvPr>
+        </p:nvSpPr>
+        <p:spPr>
+          <a:xfrm>
+            <a:off x="504000" y="1768680"/>
+            <a:ext cx="9072000" cy="4384080"/>
+          </a:xfrm>
+          <a:prstGeom prst="rect">
+            <a:avLst/>
+          </a:prstGeom>
+        </p:spPr>
+        <p:txBody>
+          <a:bodyPr lIns="0" rIns="0" tIns="0" bIns="0" anchor="ctr"/>
+          <a:p>
+            <a:pPr algn="ctr"/>
+            <a:endParaRPr/>
+          </a:p>
+        </p:txBody>
+      </p:sp>
+    </p:spTree>
+  </p:cSld>
+</p:sldLayout>
+</file>
+
+<file path=ppt/slideLayouts/slideLayout15.xml><?xml version="1.0" encoding="utf-8"?>
+<p:sldLayout xmlns:a="http://schemas.openxmlformats.org/drawingml/2006/main" xmlns:p="http://schemas.openxmlformats.org/presentationml/2006/main" xmlns:r="http://schemas.openxmlformats.org/officeDocument/2006/relationships" type="obj" preserve="1">
+  <p:cSld name="Title, Content">
+    <p:spTree>
+      <p:nvGrpSpPr>
+        <p:cNvPr id="1" name=""/>
+        <p:cNvGrpSpPr/>
+        <p:nvPr/>
+      </p:nvGrpSpPr>
+      <p:grpSpPr>
+        <a:xfrm>
+          <a:off x="0" y="0"/>
+          <a:ext cx="0" cy="0"/>
+          <a:chOff x="0" y="0"/>
+          <a:chExt cx="0" cy="0"/>
+        </a:xfrm>
+      </p:grpSpPr>
+      <p:sp>
+        <p:nvSpPr>
+          <p:cNvPr id="40" name="PlaceHolder 1"/>
+          <p:cNvSpPr>
+            <a:spLocks noGrp="1"/>
+          </p:cNvSpPr>
+          <p:nvPr>
+            <p:ph type="title"/>
+          </p:nvPr>
+        </p:nvSpPr>
+        <p:spPr>
+          <a:xfrm>
+            <a:off x="504000" y="301320"/>
+            <a:ext cx="9072000" cy="1261800"/>
+          </a:xfrm>
+          <a:prstGeom prst="rect">
+            <a:avLst/>
+          </a:prstGeom>
+        </p:spPr>
+        <p:txBody>
+          <a:bodyPr lIns="0" rIns="0" tIns="0" bIns="0" anchor="ctr"/>
+          <a:p>
+            <a:pPr algn="ctr"/>
+            <a:endParaRPr/>
+          </a:p>
+        </p:txBody>
+      </p:sp>
+      <p:sp>
+        <p:nvSpPr>
+          <p:cNvPr id="41" name="PlaceHolder 2"/>
+          <p:cNvSpPr>
+            <a:spLocks noGrp="1"/>
+          </p:cNvSpPr>
+          <p:nvPr>
+            <p:ph type="body"/>
+          </p:nvPr>
+        </p:nvSpPr>
+        <p:spPr>
+          <a:xfrm>
+            <a:off x="504000" y="1768680"/>
+            <a:ext cx="9072000" cy="4384080"/>
+          </a:xfrm>
+          <a:prstGeom prst="rect">
+            <a:avLst/>
+          </a:prstGeom>
+        </p:spPr>
+        <p:txBody>
+          <a:bodyPr lIns="0" rIns="0" tIns="0" bIns="0"/>
+          <a:p>
+            <a:endParaRPr/>
+          </a:p>
+        </p:txBody>
+      </p:sp>
+    </p:spTree>
+  </p:cSld>
+</p:sldLayout>
+</file>
+
+<file path=ppt/slideLayouts/slideLayout16.xml><?xml version="1.0" encoding="utf-8"?>
+<p:sldLayout xmlns:a="http://schemas.openxmlformats.org/drawingml/2006/main" xmlns:p="http://schemas.openxmlformats.org/presentationml/2006/main" xmlns:r="http://schemas.openxmlformats.org/officeDocument/2006/relationships" type="twoObj" preserve="1">
+  <p:cSld name="Title, 2 Content">
+    <p:spTree>
+      <p:nvGrpSpPr>
+        <p:cNvPr id="1" name=""/>
+        <p:cNvGrpSpPr/>
+        <p:nvPr/>
+      </p:nvGrpSpPr>
+      <p:grpSpPr>
+        <a:xfrm>
+          <a:off x="0" y="0"/>
+          <a:ext cx="0" cy="0"/>
+          <a:chOff x="0" y="0"/>
+          <a:chExt cx="0" cy="0"/>
+        </a:xfrm>
+      </p:grpSpPr>
+      <p:sp>
+        <p:nvSpPr>
+          <p:cNvPr id="42" name="PlaceHolder 1"/>
+          <p:cNvSpPr>
+            <a:spLocks noGrp="1"/>
+          </p:cNvSpPr>
+          <p:nvPr>
+            <p:ph type="title"/>
+          </p:nvPr>
+        </p:nvSpPr>
+        <p:spPr>
+          <a:xfrm>
+            <a:off x="504000" y="301320"/>
+            <a:ext cx="9072000" cy="1261800"/>
+          </a:xfrm>
+          <a:prstGeom prst="rect">
+            <a:avLst/>
+          </a:prstGeom>
+        </p:spPr>
+        <p:txBody>
+          <a:bodyPr lIns="0" rIns="0" tIns="0" bIns="0" anchor="ctr"/>
+          <a:p>
+            <a:pPr algn="ctr"/>
+            <a:endParaRPr/>
+          </a:p>
+        </p:txBody>
+      </p:sp>
+      <p:sp>
+        <p:nvSpPr>
+          <p:cNvPr id="43" name="PlaceHolder 2"/>
+          <p:cNvSpPr>
+            <a:spLocks noGrp="1"/>
+          </p:cNvSpPr>
+          <p:nvPr>
+            <p:ph type="body"/>
+          </p:nvPr>
+        </p:nvSpPr>
+        <p:spPr>
+          <a:xfrm>
+            <a:off x="504000" y="1768680"/>
+            <a:ext cx="4426920" cy="4384080"/>
+          </a:xfrm>
+          <a:prstGeom prst="rect">
+            <a:avLst/>
+          </a:prstGeom>
+        </p:spPr>
+        <p:txBody>
+          <a:bodyPr lIns="0" rIns="0" tIns="0" bIns="0"/>
+          <a:p>
+            <a:endParaRPr/>
+          </a:p>
+        </p:txBody>
+      </p:sp>
+      <p:sp>
+        <p:nvSpPr>
+          <p:cNvPr id="44" name="PlaceHolder 3"/>
+          <p:cNvSpPr>
+            <a:spLocks noGrp="1"/>
+          </p:cNvSpPr>
+          <p:nvPr>
+            <p:ph type="body"/>
+          </p:nvPr>
+        </p:nvSpPr>
+        <p:spPr>
+          <a:xfrm>
+            <a:off x="5152680" y="1768680"/>
+            <a:ext cx="4426920" cy="4384080"/>
+          </a:xfrm>
+          <a:prstGeom prst="rect">
+            <a:avLst/>
+          </a:prstGeom>
+        </p:spPr>
+        <p:txBody>
+          <a:bodyPr lIns="0" rIns="0" tIns="0" bIns="0"/>
+          <a:p>
+            <a:endParaRPr/>
+          </a:p>
+        </p:txBody>
+      </p:sp>
+    </p:spTree>
+  </p:cSld>
+</p:sldLayout>
+</file>
+
+<file path=ppt/slideLayouts/slideLayout17.xml><?xml version="1.0" encoding="utf-8"?>
+<p:sldLayout xmlns:a="http://schemas.openxmlformats.org/drawingml/2006/main" xmlns:p="http://schemas.openxmlformats.org/presentationml/2006/main" xmlns:r="http://schemas.openxmlformats.org/officeDocument/2006/relationships" type="titleOnly" preserve="1">
+  <p:cSld name="Title Only">
+    <p:spTree>
+      <p:nvGrpSpPr>
+        <p:cNvPr id="1" name=""/>
+        <p:cNvGrpSpPr/>
+        <p:nvPr/>
+      </p:nvGrpSpPr>
+      <p:grpSpPr>
+        <a:xfrm>
+          <a:off x="0" y="0"/>
+          <a:ext cx="0" cy="0"/>
+          <a:chOff x="0" y="0"/>
+          <a:chExt cx="0" cy="0"/>
+        </a:xfrm>
+      </p:grpSpPr>
+      <p:sp>
+        <p:nvSpPr>
+          <p:cNvPr id="45" name="PlaceHolder 1"/>
+          <p:cNvSpPr>
+            <a:spLocks noGrp="1"/>
+          </p:cNvSpPr>
+          <p:nvPr>
+            <p:ph type="title"/>
+          </p:nvPr>
+        </p:nvSpPr>
+        <p:spPr>
+          <a:xfrm>
+            <a:off x="504000" y="301320"/>
+            <a:ext cx="9072000" cy="1261800"/>
+          </a:xfrm>
+          <a:prstGeom prst="rect">
+            <a:avLst/>
+          </a:prstGeom>
+        </p:spPr>
+        <p:txBody>
+          <a:bodyPr lIns="0" rIns="0" tIns="0" bIns="0" anchor="ctr"/>
+          <a:p>
+            <a:pPr algn="ctr"/>
+            <a:endParaRPr/>
+          </a:p>
+        </p:txBody>
+      </p:sp>
+    </p:spTree>
+  </p:cSld>
+</p:sldLayout>
+</file>
+
+<file path=ppt/slideLayouts/slideLayout18.xml><?xml version="1.0" encoding="utf-8"?>
+<p:sldLayout xmlns:a="http://schemas.openxmlformats.org/drawingml/2006/main" xmlns:p="http://schemas.openxmlformats.org/presentationml/2006/main" xmlns:r="http://schemas.openxmlformats.org/officeDocument/2006/relationships" type="objOnly" preserve="1">
+  <p:cSld name="Centered Text">
+    <p:spTree>
+      <p:nvGrpSpPr>
+        <p:cNvPr id="1" name=""/>
+        <p:cNvGrpSpPr/>
+        <p:nvPr/>
+      </p:nvGrpSpPr>
+      <p:grpSpPr>
+        <a:xfrm>
+          <a:off x="0" y="0"/>
+          <a:ext cx="0" cy="0"/>
+          <a:chOff x="0" y="0"/>
+          <a:chExt cx="0" cy="0"/>
+        </a:xfrm>
+      </p:grpSpPr>
+      <p:sp>
+        <p:nvSpPr>
+          <p:cNvPr id="46" name="PlaceHolder 1"/>
+          <p:cNvSpPr>
+            <a:spLocks noGrp="1"/>
+          </p:cNvSpPr>
+          <p:nvPr>
+            <p:ph type="subTitle"/>
+          </p:nvPr>
+        </p:nvSpPr>
+        <p:spPr>
+          <a:xfrm>
+            <a:off x="504000" y="301320"/>
+            <a:ext cx="9072000" cy="5850360"/>
+          </a:xfrm>
+          <a:prstGeom prst="rect">
+            <a:avLst/>
+          </a:prstGeom>
+        </p:spPr>
+        <p:txBody>
+          <a:bodyPr lIns="0" rIns="0" tIns="0" bIns="0" anchor="ctr"/>
+          <a:p>
+            <a:pPr algn="ctr"/>
+            <a:endParaRPr/>
+          </a:p>
+        </p:txBody>
+      </p:sp>
+    </p:spTree>
+  </p:cSld>
+</p:sldLayout>
+</file>
+
+<file path=ppt/slideLayouts/slideLayout19.xml><?xml version="1.0" encoding="utf-8"?>
+<p:sldLayout xmlns:a="http://schemas.openxmlformats.org/drawingml/2006/main" xmlns:p="http://schemas.openxmlformats.org/presentationml/2006/main" xmlns:r="http://schemas.openxmlformats.org/officeDocument/2006/relationships" type="twoObjAndObj" preserve="1">
+  <p:cSld name="Title, 2 Content and Content">
+    <p:spTree>
+      <p:nvGrpSpPr>
+        <p:cNvPr id="1" name=""/>
+        <p:cNvGrpSpPr/>
+        <p:nvPr/>
+      </p:nvGrpSpPr>
+      <p:grpSpPr>
+        <a:xfrm>
+          <a:off x="0" y="0"/>
+          <a:ext cx="0" cy="0"/>
+          <a:chOff x="0" y="0"/>
+          <a:chExt cx="0" cy="0"/>
+        </a:xfrm>
+      </p:grpSpPr>
+      <p:sp>
+        <p:nvSpPr>
+          <p:cNvPr id="47" name="PlaceHolder 1"/>
+          <p:cNvSpPr>
+            <a:spLocks noGrp="1"/>
+          </p:cNvSpPr>
+          <p:nvPr>
+            <p:ph type="title"/>
+          </p:nvPr>
+        </p:nvSpPr>
+        <p:spPr>
+          <a:xfrm>
+            <a:off x="504000" y="301320"/>
+            <a:ext cx="9072000" cy="1261800"/>
+          </a:xfrm>
+          <a:prstGeom prst="rect">
+            <a:avLst/>
+          </a:prstGeom>
+        </p:spPr>
+        <p:txBody>
+          <a:bodyPr lIns="0" rIns="0" tIns="0" bIns="0" anchor="ctr"/>
+          <a:p>
+            <a:pPr algn="ctr"/>
+            <a:endParaRPr/>
+          </a:p>
+        </p:txBody>
+      </p:sp>
+      <p:sp>
+        <p:nvSpPr>
+          <p:cNvPr id="48" name="PlaceHolder 2"/>
+          <p:cNvSpPr>
+            <a:spLocks noGrp="1"/>
+          </p:cNvSpPr>
+          <p:nvPr>
+            <p:ph type="body"/>
+          </p:nvPr>
+        </p:nvSpPr>
+        <p:spPr>
+          <a:xfrm>
+            <a:off x="504000" y="1768680"/>
+            <a:ext cx="4426920" cy="2090880"/>
+          </a:xfrm>
+          <a:prstGeom prst="rect">
+            <a:avLst/>
+          </a:prstGeom>
+        </p:spPr>
+        <p:txBody>
+          <a:bodyPr lIns="0" rIns="0" tIns="0" bIns="0"/>
+          <a:p>
+            <a:endParaRPr/>
+          </a:p>
+        </p:txBody>
+      </p:sp>
+      <p:sp>
+        <p:nvSpPr>
+          <p:cNvPr id="49" name="PlaceHolder 3"/>
+          <p:cNvSpPr>
+            <a:spLocks noGrp="1"/>
+          </p:cNvSpPr>
+          <p:nvPr>
+            <p:ph type="body"/>
+          </p:nvPr>
+        </p:nvSpPr>
+        <p:spPr>
+          <a:xfrm>
+            <a:off x="504000" y="4058640"/>
+            <a:ext cx="4426920" cy="2090880"/>
+          </a:xfrm>
+          <a:prstGeom prst="rect">
+            <a:avLst/>
+          </a:prstGeom>
+        </p:spPr>
+        <p:txBody>
+          <a:bodyPr lIns="0" rIns="0" tIns="0" bIns="0"/>
+          <a:p>
+            <a:endParaRPr/>
+          </a:p>
+        </p:txBody>
+      </p:sp>
+      <p:sp>
+        <p:nvSpPr>
+          <p:cNvPr id="50" name="PlaceHolder 4"/>
+          <p:cNvSpPr>
+            <a:spLocks noGrp="1"/>
+          </p:cNvSpPr>
+          <p:nvPr>
+            <p:ph type="body"/>
+          </p:nvPr>
+        </p:nvSpPr>
+        <p:spPr>
+          <a:xfrm>
+            <a:off x="5152680" y="1768680"/>
+            <a:ext cx="4426920" cy="4384080"/>
+          </a:xfrm>
+          <a:prstGeom prst="rect">
+            <a:avLst/>
+          </a:prstGeom>
+        </p:spPr>
+        <p:txBody>
+          <a:bodyPr lIns="0" rIns="0" tIns="0" bIns="0"/>
+          <a:p>
+            <a:endParaRPr/>
+          </a:p>
+        </p:txBody>
+      </p:sp>
     </p:spTree>
   </p:cSld>
 </p:sldLayout>
@@ -460,7 +960,7 @@
       </p:grpSpPr>
       <p:sp>
         <p:nvSpPr>
-          <p:cNvPr id="5" name="PlaceHolder 1"/>
+          <p:cNvPr id="2" name="PlaceHolder 1"/>
           <p:cNvSpPr>
             <a:spLocks noGrp="1"/>
           </p:cNvSpPr>
@@ -471,7 +971,7 @@
         <p:spPr>
           <a:xfrm>
             <a:off x="504000" y="301320"/>
-            <a:ext cx="9071640" cy="1262160"/>
+            <a:ext cx="9072000" cy="1261800"/>
           </a:xfrm>
           <a:prstGeom prst="rect">
             <a:avLst/>
@@ -487,7 +987,7 @@
       </p:sp>
       <p:sp>
         <p:nvSpPr>
-          <p:cNvPr id="6" name="PlaceHolder 2"/>
+          <p:cNvPr id="3" name="PlaceHolder 2"/>
           <p:cNvSpPr>
             <a:spLocks noGrp="1"/>
           </p:cNvSpPr>
@@ -497,8 +997,8 @@
         </p:nvSpPr>
         <p:spPr>
           <a:xfrm>
-            <a:off x="504000" y="1769040"/>
-            <a:ext cx="9071640" cy="4384440"/>
+            <a:off x="504000" y="1768680"/>
+            <a:ext cx="9072000" cy="4384080"/>
           </a:xfrm>
           <a:prstGeom prst="rect">
             <a:avLst/>
@@ -512,6 +1012,661 @@
           </a:p>
         </p:txBody>
       </p:sp>
+    </p:spTree>
+  </p:cSld>
+</p:sldLayout>
+</file>
+
+<file path=ppt/slideLayouts/slideLayout20.xml><?xml version="1.0" encoding="utf-8"?>
+<p:sldLayout xmlns:a="http://schemas.openxmlformats.org/drawingml/2006/main" xmlns:p="http://schemas.openxmlformats.org/presentationml/2006/main" xmlns:r="http://schemas.openxmlformats.org/officeDocument/2006/relationships" type="objAndTwoObj" preserve="1">
+  <p:cSld name="Title Content and 2 Content">
+    <p:spTree>
+      <p:nvGrpSpPr>
+        <p:cNvPr id="1" name=""/>
+        <p:cNvGrpSpPr/>
+        <p:nvPr/>
+      </p:nvGrpSpPr>
+      <p:grpSpPr>
+        <a:xfrm>
+          <a:off x="0" y="0"/>
+          <a:ext cx="0" cy="0"/>
+          <a:chOff x="0" y="0"/>
+          <a:chExt cx="0" cy="0"/>
+        </a:xfrm>
+      </p:grpSpPr>
+      <p:sp>
+        <p:nvSpPr>
+          <p:cNvPr id="51" name="PlaceHolder 1"/>
+          <p:cNvSpPr>
+            <a:spLocks noGrp="1"/>
+          </p:cNvSpPr>
+          <p:nvPr>
+            <p:ph type="title"/>
+          </p:nvPr>
+        </p:nvSpPr>
+        <p:spPr>
+          <a:xfrm>
+            <a:off x="504000" y="301320"/>
+            <a:ext cx="9072000" cy="1261800"/>
+          </a:xfrm>
+          <a:prstGeom prst="rect">
+            <a:avLst/>
+          </a:prstGeom>
+        </p:spPr>
+        <p:txBody>
+          <a:bodyPr lIns="0" rIns="0" tIns="0" bIns="0" anchor="ctr"/>
+          <a:p>
+            <a:pPr algn="ctr"/>
+            <a:endParaRPr/>
+          </a:p>
+        </p:txBody>
+      </p:sp>
+      <p:sp>
+        <p:nvSpPr>
+          <p:cNvPr id="52" name="PlaceHolder 2"/>
+          <p:cNvSpPr>
+            <a:spLocks noGrp="1"/>
+          </p:cNvSpPr>
+          <p:nvPr>
+            <p:ph type="body"/>
+          </p:nvPr>
+        </p:nvSpPr>
+        <p:spPr>
+          <a:xfrm>
+            <a:off x="504000" y="1768680"/>
+            <a:ext cx="4426920" cy="4384080"/>
+          </a:xfrm>
+          <a:prstGeom prst="rect">
+            <a:avLst/>
+          </a:prstGeom>
+        </p:spPr>
+        <p:txBody>
+          <a:bodyPr lIns="0" rIns="0" tIns="0" bIns="0"/>
+          <a:p>
+            <a:endParaRPr/>
+          </a:p>
+        </p:txBody>
+      </p:sp>
+      <p:sp>
+        <p:nvSpPr>
+          <p:cNvPr id="53" name="PlaceHolder 3"/>
+          <p:cNvSpPr>
+            <a:spLocks noGrp="1"/>
+          </p:cNvSpPr>
+          <p:nvPr>
+            <p:ph type="body"/>
+          </p:nvPr>
+        </p:nvSpPr>
+        <p:spPr>
+          <a:xfrm>
+            <a:off x="5152680" y="1768680"/>
+            <a:ext cx="4426920" cy="2090880"/>
+          </a:xfrm>
+          <a:prstGeom prst="rect">
+            <a:avLst/>
+          </a:prstGeom>
+        </p:spPr>
+        <p:txBody>
+          <a:bodyPr lIns="0" rIns="0" tIns="0" bIns="0"/>
+          <a:p>
+            <a:endParaRPr/>
+          </a:p>
+        </p:txBody>
+      </p:sp>
+      <p:sp>
+        <p:nvSpPr>
+          <p:cNvPr id="54" name="PlaceHolder 4"/>
+          <p:cNvSpPr>
+            <a:spLocks noGrp="1"/>
+          </p:cNvSpPr>
+          <p:nvPr>
+            <p:ph type="body"/>
+          </p:nvPr>
+        </p:nvSpPr>
+        <p:spPr>
+          <a:xfrm>
+            <a:off x="5152680" y="4058640"/>
+            <a:ext cx="4426920" cy="2090880"/>
+          </a:xfrm>
+          <a:prstGeom prst="rect">
+            <a:avLst/>
+          </a:prstGeom>
+        </p:spPr>
+        <p:txBody>
+          <a:bodyPr lIns="0" rIns="0" tIns="0" bIns="0"/>
+          <a:p>
+            <a:endParaRPr/>
+          </a:p>
+        </p:txBody>
+      </p:sp>
+    </p:spTree>
+  </p:cSld>
+</p:sldLayout>
+</file>
+
+<file path=ppt/slideLayouts/slideLayout21.xml><?xml version="1.0" encoding="utf-8"?>
+<p:sldLayout xmlns:a="http://schemas.openxmlformats.org/drawingml/2006/main" xmlns:p="http://schemas.openxmlformats.org/presentationml/2006/main" xmlns:r="http://schemas.openxmlformats.org/officeDocument/2006/relationships" type="twoObjOverTx" preserve="1">
+  <p:cSld name="Title, 2 Content over Content">
+    <p:spTree>
+      <p:nvGrpSpPr>
+        <p:cNvPr id="1" name=""/>
+        <p:cNvGrpSpPr/>
+        <p:nvPr/>
+      </p:nvGrpSpPr>
+      <p:grpSpPr>
+        <a:xfrm>
+          <a:off x="0" y="0"/>
+          <a:ext cx="0" cy="0"/>
+          <a:chOff x="0" y="0"/>
+          <a:chExt cx="0" cy="0"/>
+        </a:xfrm>
+      </p:grpSpPr>
+      <p:sp>
+        <p:nvSpPr>
+          <p:cNvPr id="55" name="PlaceHolder 1"/>
+          <p:cNvSpPr>
+            <a:spLocks noGrp="1"/>
+          </p:cNvSpPr>
+          <p:nvPr>
+            <p:ph type="title"/>
+          </p:nvPr>
+        </p:nvSpPr>
+        <p:spPr>
+          <a:xfrm>
+            <a:off x="504000" y="301320"/>
+            <a:ext cx="9072000" cy="1261800"/>
+          </a:xfrm>
+          <a:prstGeom prst="rect">
+            <a:avLst/>
+          </a:prstGeom>
+        </p:spPr>
+        <p:txBody>
+          <a:bodyPr lIns="0" rIns="0" tIns="0" bIns="0" anchor="ctr"/>
+          <a:p>
+            <a:pPr algn="ctr"/>
+            <a:endParaRPr/>
+          </a:p>
+        </p:txBody>
+      </p:sp>
+      <p:sp>
+        <p:nvSpPr>
+          <p:cNvPr id="56" name="PlaceHolder 2"/>
+          <p:cNvSpPr>
+            <a:spLocks noGrp="1"/>
+          </p:cNvSpPr>
+          <p:nvPr>
+            <p:ph type="body"/>
+          </p:nvPr>
+        </p:nvSpPr>
+        <p:spPr>
+          <a:xfrm>
+            <a:off x="504000" y="1768680"/>
+            <a:ext cx="4426920" cy="2090880"/>
+          </a:xfrm>
+          <a:prstGeom prst="rect">
+            <a:avLst/>
+          </a:prstGeom>
+        </p:spPr>
+        <p:txBody>
+          <a:bodyPr lIns="0" rIns="0" tIns="0" bIns="0"/>
+          <a:p>
+            <a:endParaRPr/>
+          </a:p>
+        </p:txBody>
+      </p:sp>
+      <p:sp>
+        <p:nvSpPr>
+          <p:cNvPr id="57" name="PlaceHolder 3"/>
+          <p:cNvSpPr>
+            <a:spLocks noGrp="1"/>
+          </p:cNvSpPr>
+          <p:nvPr>
+            <p:ph type="body"/>
+          </p:nvPr>
+        </p:nvSpPr>
+        <p:spPr>
+          <a:xfrm>
+            <a:off x="5152680" y="1768680"/>
+            <a:ext cx="4426920" cy="2090880"/>
+          </a:xfrm>
+          <a:prstGeom prst="rect">
+            <a:avLst/>
+          </a:prstGeom>
+        </p:spPr>
+        <p:txBody>
+          <a:bodyPr lIns="0" rIns="0" tIns="0" bIns="0"/>
+          <a:p>
+            <a:endParaRPr/>
+          </a:p>
+        </p:txBody>
+      </p:sp>
+      <p:sp>
+        <p:nvSpPr>
+          <p:cNvPr id="58" name="PlaceHolder 4"/>
+          <p:cNvSpPr>
+            <a:spLocks noGrp="1"/>
+          </p:cNvSpPr>
+          <p:nvPr>
+            <p:ph type="body"/>
+          </p:nvPr>
+        </p:nvSpPr>
+        <p:spPr>
+          <a:xfrm>
+            <a:off x="504000" y="4058640"/>
+            <a:ext cx="9072000" cy="2090880"/>
+          </a:xfrm>
+          <a:prstGeom prst="rect">
+            <a:avLst/>
+          </a:prstGeom>
+        </p:spPr>
+        <p:txBody>
+          <a:bodyPr lIns="0" rIns="0" tIns="0" bIns="0"/>
+          <a:p>
+            <a:endParaRPr/>
+          </a:p>
+        </p:txBody>
+      </p:sp>
+    </p:spTree>
+  </p:cSld>
+</p:sldLayout>
+</file>
+
+<file path=ppt/slideLayouts/slideLayout22.xml><?xml version="1.0" encoding="utf-8"?>
+<p:sldLayout xmlns:a="http://schemas.openxmlformats.org/drawingml/2006/main" xmlns:p="http://schemas.openxmlformats.org/presentationml/2006/main" xmlns:r="http://schemas.openxmlformats.org/officeDocument/2006/relationships" type="objOverTx" preserve="1">
+  <p:cSld name="Title, Content over Content">
+    <p:spTree>
+      <p:nvGrpSpPr>
+        <p:cNvPr id="1" name=""/>
+        <p:cNvGrpSpPr/>
+        <p:nvPr/>
+      </p:nvGrpSpPr>
+      <p:grpSpPr>
+        <a:xfrm>
+          <a:off x="0" y="0"/>
+          <a:ext cx="0" cy="0"/>
+          <a:chOff x="0" y="0"/>
+          <a:chExt cx="0" cy="0"/>
+        </a:xfrm>
+      </p:grpSpPr>
+      <p:sp>
+        <p:nvSpPr>
+          <p:cNvPr id="59" name="PlaceHolder 1"/>
+          <p:cNvSpPr>
+            <a:spLocks noGrp="1"/>
+          </p:cNvSpPr>
+          <p:nvPr>
+            <p:ph type="title"/>
+          </p:nvPr>
+        </p:nvSpPr>
+        <p:spPr>
+          <a:xfrm>
+            <a:off x="504000" y="301320"/>
+            <a:ext cx="9072000" cy="1261800"/>
+          </a:xfrm>
+          <a:prstGeom prst="rect">
+            <a:avLst/>
+          </a:prstGeom>
+        </p:spPr>
+        <p:txBody>
+          <a:bodyPr lIns="0" rIns="0" tIns="0" bIns="0" anchor="ctr"/>
+          <a:p>
+            <a:pPr algn="ctr"/>
+            <a:endParaRPr/>
+          </a:p>
+        </p:txBody>
+      </p:sp>
+      <p:sp>
+        <p:nvSpPr>
+          <p:cNvPr id="60" name="PlaceHolder 2"/>
+          <p:cNvSpPr>
+            <a:spLocks noGrp="1"/>
+          </p:cNvSpPr>
+          <p:nvPr>
+            <p:ph type="body"/>
+          </p:nvPr>
+        </p:nvSpPr>
+        <p:spPr>
+          <a:xfrm>
+            <a:off x="504000" y="1768680"/>
+            <a:ext cx="9072000" cy="2090880"/>
+          </a:xfrm>
+          <a:prstGeom prst="rect">
+            <a:avLst/>
+          </a:prstGeom>
+        </p:spPr>
+        <p:txBody>
+          <a:bodyPr lIns="0" rIns="0" tIns="0" bIns="0"/>
+          <a:p>
+            <a:endParaRPr/>
+          </a:p>
+        </p:txBody>
+      </p:sp>
+      <p:sp>
+        <p:nvSpPr>
+          <p:cNvPr id="61" name="PlaceHolder 3"/>
+          <p:cNvSpPr>
+            <a:spLocks noGrp="1"/>
+          </p:cNvSpPr>
+          <p:nvPr>
+            <p:ph type="body"/>
+          </p:nvPr>
+        </p:nvSpPr>
+        <p:spPr>
+          <a:xfrm>
+            <a:off x="504000" y="4058640"/>
+            <a:ext cx="9072000" cy="2090880"/>
+          </a:xfrm>
+          <a:prstGeom prst="rect">
+            <a:avLst/>
+          </a:prstGeom>
+        </p:spPr>
+        <p:txBody>
+          <a:bodyPr lIns="0" rIns="0" tIns="0" bIns="0"/>
+          <a:p>
+            <a:endParaRPr/>
+          </a:p>
+        </p:txBody>
+      </p:sp>
+    </p:spTree>
+  </p:cSld>
+</p:sldLayout>
+</file>
+
+<file path=ppt/slideLayouts/slideLayout23.xml><?xml version="1.0" encoding="utf-8"?>
+<p:sldLayout xmlns:a="http://schemas.openxmlformats.org/drawingml/2006/main" xmlns:p="http://schemas.openxmlformats.org/presentationml/2006/main" xmlns:r="http://schemas.openxmlformats.org/officeDocument/2006/relationships" type="fourObj" preserve="1">
+  <p:cSld name="Title, 4 Content">
+    <p:spTree>
+      <p:nvGrpSpPr>
+        <p:cNvPr id="1" name=""/>
+        <p:cNvGrpSpPr/>
+        <p:nvPr/>
+      </p:nvGrpSpPr>
+      <p:grpSpPr>
+        <a:xfrm>
+          <a:off x="0" y="0"/>
+          <a:ext cx="0" cy="0"/>
+          <a:chOff x="0" y="0"/>
+          <a:chExt cx="0" cy="0"/>
+        </a:xfrm>
+      </p:grpSpPr>
+      <p:sp>
+        <p:nvSpPr>
+          <p:cNvPr id="62" name="PlaceHolder 1"/>
+          <p:cNvSpPr>
+            <a:spLocks noGrp="1"/>
+          </p:cNvSpPr>
+          <p:nvPr>
+            <p:ph type="title"/>
+          </p:nvPr>
+        </p:nvSpPr>
+        <p:spPr>
+          <a:xfrm>
+            <a:off x="504000" y="301320"/>
+            <a:ext cx="9072000" cy="1261800"/>
+          </a:xfrm>
+          <a:prstGeom prst="rect">
+            <a:avLst/>
+          </a:prstGeom>
+        </p:spPr>
+        <p:txBody>
+          <a:bodyPr lIns="0" rIns="0" tIns="0" bIns="0" anchor="ctr"/>
+          <a:p>
+            <a:pPr algn="ctr"/>
+            <a:endParaRPr/>
+          </a:p>
+        </p:txBody>
+      </p:sp>
+      <p:sp>
+        <p:nvSpPr>
+          <p:cNvPr id="63" name="PlaceHolder 2"/>
+          <p:cNvSpPr>
+            <a:spLocks noGrp="1"/>
+          </p:cNvSpPr>
+          <p:nvPr>
+            <p:ph type="body"/>
+          </p:nvPr>
+        </p:nvSpPr>
+        <p:spPr>
+          <a:xfrm>
+            <a:off x="504000" y="1768680"/>
+            <a:ext cx="4426920" cy="2090880"/>
+          </a:xfrm>
+          <a:prstGeom prst="rect">
+            <a:avLst/>
+          </a:prstGeom>
+        </p:spPr>
+        <p:txBody>
+          <a:bodyPr lIns="0" rIns="0" tIns="0" bIns="0"/>
+          <a:p>
+            <a:endParaRPr/>
+          </a:p>
+        </p:txBody>
+      </p:sp>
+      <p:sp>
+        <p:nvSpPr>
+          <p:cNvPr id="64" name="PlaceHolder 3"/>
+          <p:cNvSpPr>
+            <a:spLocks noGrp="1"/>
+          </p:cNvSpPr>
+          <p:nvPr>
+            <p:ph type="body"/>
+          </p:nvPr>
+        </p:nvSpPr>
+        <p:spPr>
+          <a:xfrm>
+            <a:off x="5152680" y="1768680"/>
+            <a:ext cx="4426920" cy="2090880"/>
+          </a:xfrm>
+          <a:prstGeom prst="rect">
+            <a:avLst/>
+          </a:prstGeom>
+        </p:spPr>
+        <p:txBody>
+          <a:bodyPr lIns="0" rIns="0" tIns="0" bIns="0"/>
+          <a:p>
+            <a:endParaRPr/>
+          </a:p>
+        </p:txBody>
+      </p:sp>
+      <p:sp>
+        <p:nvSpPr>
+          <p:cNvPr id="65" name="PlaceHolder 4"/>
+          <p:cNvSpPr>
+            <a:spLocks noGrp="1"/>
+          </p:cNvSpPr>
+          <p:nvPr>
+            <p:ph type="body"/>
+          </p:nvPr>
+        </p:nvSpPr>
+        <p:spPr>
+          <a:xfrm>
+            <a:off x="5152680" y="4058640"/>
+            <a:ext cx="4426920" cy="2090880"/>
+          </a:xfrm>
+          <a:prstGeom prst="rect">
+            <a:avLst/>
+          </a:prstGeom>
+        </p:spPr>
+        <p:txBody>
+          <a:bodyPr lIns="0" rIns="0" tIns="0" bIns="0"/>
+          <a:p>
+            <a:endParaRPr/>
+          </a:p>
+        </p:txBody>
+      </p:sp>
+      <p:sp>
+        <p:nvSpPr>
+          <p:cNvPr id="66" name="PlaceHolder 5"/>
+          <p:cNvSpPr>
+            <a:spLocks noGrp="1"/>
+          </p:cNvSpPr>
+          <p:nvPr>
+            <p:ph type="body"/>
+          </p:nvPr>
+        </p:nvSpPr>
+        <p:spPr>
+          <a:xfrm>
+            <a:off x="504000" y="4058640"/>
+            <a:ext cx="4426920" cy="2090880"/>
+          </a:xfrm>
+          <a:prstGeom prst="rect">
+            <a:avLst/>
+          </a:prstGeom>
+        </p:spPr>
+        <p:txBody>
+          <a:bodyPr lIns="0" rIns="0" tIns="0" bIns="0"/>
+          <a:p>
+            <a:endParaRPr/>
+          </a:p>
+        </p:txBody>
+      </p:sp>
+    </p:spTree>
+  </p:cSld>
+</p:sldLayout>
+</file>
+
+<file path=ppt/slideLayouts/slideLayout24.xml><?xml version="1.0" encoding="utf-8"?>
+<p:sldLayout xmlns:a="http://schemas.openxmlformats.org/drawingml/2006/main" xmlns:p="http://schemas.openxmlformats.org/presentationml/2006/main" xmlns:r="http://schemas.openxmlformats.org/officeDocument/2006/relationships" type="blank" preserve="1">
+  <p:cSld name="Title, 6 Content">
+    <p:spTree>
+      <p:nvGrpSpPr>
+        <p:cNvPr id="1" name=""/>
+        <p:cNvGrpSpPr/>
+        <p:nvPr/>
+      </p:nvGrpSpPr>
+      <p:grpSpPr>
+        <a:xfrm>
+          <a:off x="0" y="0"/>
+          <a:ext cx="0" cy="0"/>
+          <a:chOff x="0" y="0"/>
+          <a:chExt cx="0" cy="0"/>
+        </a:xfrm>
+      </p:grpSpPr>
+      <p:sp>
+        <p:nvSpPr>
+          <p:cNvPr id="67" name="PlaceHolder 1"/>
+          <p:cNvSpPr>
+            <a:spLocks noGrp="1"/>
+          </p:cNvSpPr>
+          <p:nvPr>
+            <p:ph type="title"/>
+          </p:nvPr>
+        </p:nvSpPr>
+        <p:spPr>
+          <a:xfrm>
+            <a:off x="504000" y="301320"/>
+            <a:ext cx="9072000" cy="1261800"/>
+          </a:xfrm>
+          <a:prstGeom prst="rect">
+            <a:avLst/>
+          </a:prstGeom>
+        </p:spPr>
+        <p:txBody>
+          <a:bodyPr lIns="0" rIns="0" tIns="0" bIns="0" anchor="ctr"/>
+          <a:p>
+            <a:pPr algn="ctr"/>
+            <a:endParaRPr/>
+          </a:p>
+        </p:txBody>
+      </p:sp>
+      <p:sp>
+        <p:nvSpPr>
+          <p:cNvPr id="68" name="PlaceHolder 2"/>
+          <p:cNvSpPr>
+            <a:spLocks noGrp="1"/>
+          </p:cNvSpPr>
+          <p:nvPr>
+            <p:ph type="body"/>
+          </p:nvPr>
+        </p:nvSpPr>
+        <p:spPr>
+          <a:xfrm>
+            <a:off x="504000" y="1768680"/>
+            <a:ext cx="9072000" cy="4384080"/>
+          </a:xfrm>
+          <a:prstGeom prst="rect">
+            <a:avLst/>
+          </a:prstGeom>
+        </p:spPr>
+        <p:txBody>
+          <a:bodyPr lIns="0" rIns="0" tIns="0" bIns="0"/>
+          <a:p>
+            <a:endParaRPr/>
+          </a:p>
+        </p:txBody>
+      </p:sp>
+      <p:sp>
+        <p:nvSpPr>
+          <p:cNvPr id="69" name="PlaceHolder 3"/>
+          <p:cNvSpPr>
+            <a:spLocks noGrp="1"/>
+          </p:cNvSpPr>
+          <p:nvPr>
+            <p:ph type="body"/>
+          </p:nvPr>
+        </p:nvSpPr>
+        <p:spPr>
+          <a:xfrm>
+            <a:off x="504000" y="1768680"/>
+            <a:ext cx="9072000" cy="4384080"/>
+          </a:xfrm>
+          <a:prstGeom prst="rect">
+            <a:avLst/>
+          </a:prstGeom>
+        </p:spPr>
+        <p:txBody>
+          <a:bodyPr lIns="0" rIns="0" tIns="0" bIns="0"/>
+          <a:p>
+            <a:endParaRPr/>
+          </a:p>
+        </p:txBody>
+      </p:sp>
+      <p:pic>
+        <p:nvPicPr>
+          <p:cNvPr id="70" name="" descr=""/>
+          <p:cNvPicPr/>
+          <p:nvPr/>
+        </p:nvPicPr>
+        <p:blipFill>
+          <a:blip r:embed="rId2"/>
+          <a:stretch/>
+        </p:blipFill>
+        <p:spPr>
+          <a:xfrm>
+            <a:off x="2292480" y="1768680"/>
+            <a:ext cx="5494680" cy="4384080"/>
+          </a:xfrm>
+          <a:prstGeom prst="rect">
+            <a:avLst/>
+          </a:prstGeom>
+          <a:ln>
+            <a:noFill/>
+          </a:ln>
+        </p:spPr>
+      </p:pic>
+      <p:pic>
+        <p:nvPicPr>
+          <p:cNvPr id="71" name="" descr=""/>
+          <p:cNvPicPr/>
+          <p:nvPr/>
+        </p:nvPicPr>
+        <p:blipFill>
+          <a:blip r:embed="rId3"/>
+          <a:stretch/>
+        </p:blipFill>
+        <p:spPr>
+          <a:xfrm>
+            <a:off x="2292480" y="1768680"/>
+            <a:ext cx="5494680" cy="4384080"/>
+          </a:xfrm>
+          <a:prstGeom prst="rect">
+            <a:avLst/>
+          </a:prstGeom>
+          <a:ln>
+            <a:noFill/>
+          </a:ln>
+        </p:spPr>
+      </p:pic>
     </p:spTree>
   </p:cSld>
 </p:sldLayout>
@@ -536,7 +1691,7 @@
       </p:grpSpPr>
       <p:sp>
         <p:nvSpPr>
-          <p:cNvPr id="7" name="PlaceHolder 1"/>
+          <p:cNvPr id="4" name="PlaceHolder 1"/>
           <p:cNvSpPr>
             <a:spLocks noGrp="1"/>
           </p:cNvSpPr>
@@ -547,7 +1702,7 @@
         <p:spPr>
           <a:xfrm>
             <a:off x="504000" y="301320"/>
-            <a:ext cx="9071640" cy="1262160"/>
+            <a:ext cx="9072000" cy="1261800"/>
           </a:xfrm>
           <a:prstGeom prst="rect">
             <a:avLst/>
@@ -563,7 +1718,7 @@
       </p:sp>
       <p:sp>
         <p:nvSpPr>
-          <p:cNvPr id="8" name="PlaceHolder 2"/>
+          <p:cNvPr id="5" name="PlaceHolder 2"/>
           <p:cNvSpPr>
             <a:spLocks noGrp="1"/>
           </p:cNvSpPr>
@@ -573,8 +1728,8 @@
         </p:nvSpPr>
         <p:spPr>
           <a:xfrm>
-            <a:off x="504000" y="1769040"/>
-            <a:ext cx="9071640" cy="4384440"/>
+            <a:off x="504000" y="1768680"/>
+            <a:ext cx="9072000" cy="4384080"/>
           </a:xfrm>
           <a:prstGeom prst="rect">
             <a:avLst/>
@@ -611,7 +1766,7 @@
       </p:grpSpPr>
       <p:sp>
         <p:nvSpPr>
-          <p:cNvPr id="9" name="PlaceHolder 1"/>
+          <p:cNvPr id="6" name="PlaceHolder 1"/>
           <p:cNvSpPr>
             <a:spLocks noGrp="1"/>
           </p:cNvSpPr>
@@ -622,7 +1777,7 @@
         <p:spPr>
           <a:xfrm>
             <a:off x="504000" y="301320"/>
-            <a:ext cx="9071640" cy="1262160"/>
+            <a:ext cx="9072000" cy="1261800"/>
           </a:xfrm>
           <a:prstGeom prst="rect">
             <a:avLst/>
@@ -638,7 +1793,7 @@
       </p:sp>
       <p:sp>
         <p:nvSpPr>
-          <p:cNvPr id="10" name="PlaceHolder 2"/>
+          <p:cNvPr id="7" name="PlaceHolder 2"/>
           <p:cNvSpPr>
             <a:spLocks noGrp="1"/>
           </p:cNvSpPr>
@@ -648,8 +1803,8 @@
         </p:nvSpPr>
         <p:spPr>
           <a:xfrm>
-            <a:off x="504000" y="1769040"/>
-            <a:ext cx="4426920" cy="4384440"/>
+            <a:off x="504000" y="1768680"/>
+            <a:ext cx="4426920" cy="4384080"/>
           </a:xfrm>
           <a:prstGeom prst="rect">
             <a:avLst/>
@@ -664,7 +1819,7 @@
       </p:sp>
       <p:sp>
         <p:nvSpPr>
-          <p:cNvPr id="11" name="PlaceHolder 3"/>
+          <p:cNvPr id="8" name="PlaceHolder 3"/>
           <p:cNvSpPr>
             <a:spLocks noGrp="1"/>
           </p:cNvSpPr>
@@ -674,8 +1829,8 @@
         </p:nvSpPr>
         <p:spPr>
           <a:xfrm>
-            <a:off x="5152680" y="1769040"/>
-            <a:ext cx="4426920" cy="4384440"/>
+            <a:off x="5152680" y="1768680"/>
+            <a:ext cx="4426920" cy="4384080"/>
           </a:xfrm>
           <a:prstGeom prst="rect">
             <a:avLst/>
@@ -712,7 +1867,7 @@
       </p:grpSpPr>
       <p:sp>
         <p:nvSpPr>
-          <p:cNvPr id="12" name="PlaceHolder 1"/>
+          <p:cNvPr id="9" name="PlaceHolder 1"/>
           <p:cNvSpPr>
             <a:spLocks noGrp="1"/>
           </p:cNvSpPr>
@@ -723,7 +1878,7 @@
         <p:spPr>
           <a:xfrm>
             <a:off x="504000" y="301320"/>
-            <a:ext cx="9071640" cy="1262160"/>
+            <a:ext cx="9072000" cy="1261800"/>
           </a:xfrm>
           <a:prstGeom prst="rect">
             <a:avLst/>
@@ -761,7 +1916,7 @@
       </p:grpSpPr>
       <p:sp>
         <p:nvSpPr>
-          <p:cNvPr id="13" name="PlaceHolder 1"/>
+          <p:cNvPr id="10" name="PlaceHolder 1"/>
           <p:cNvSpPr>
             <a:spLocks noGrp="1"/>
           </p:cNvSpPr>
@@ -772,7 +1927,7 @@
         <p:spPr>
           <a:xfrm>
             <a:off x="504000" y="301320"/>
-            <a:ext cx="9071640" cy="5851800"/>
+            <a:ext cx="9072000" cy="5850360"/>
           </a:xfrm>
           <a:prstGeom prst="rect">
             <a:avLst/>
@@ -810,7 +1965,7 @@
       </p:grpSpPr>
       <p:sp>
         <p:nvSpPr>
-          <p:cNvPr id="14" name="PlaceHolder 1"/>
+          <p:cNvPr id="11" name="PlaceHolder 1"/>
           <p:cNvSpPr>
             <a:spLocks noGrp="1"/>
           </p:cNvSpPr>
@@ -821,7 +1976,7 @@
         <p:spPr>
           <a:xfrm>
             <a:off x="504000" y="301320"/>
-            <a:ext cx="9071640" cy="1262160"/>
+            <a:ext cx="9072000" cy="1261800"/>
           </a:xfrm>
           <a:prstGeom prst="rect">
             <a:avLst/>
@@ -837,7 +1992,7 @@
       </p:sp>
       <p:sp>
         <p:nvSpPr>
-          <p:cNvPr id="15" name="PlaceHolder 2"/>
+          <p:cNvPr id="12" name="PlaceHolder 2"/>
           <p:cNvSpPr>
             <a:spLocks noGrp="1"/>
           </p:cNvSpPr>
@@ -847,8 +2002,8 @@
         </p:nvSpPr>
         <p:spPr>
           <a:xfrm>
-            <a:off x="504000" y="1769040"/>
-            <a:ext cx="4426920" cy="2091240"/>
+            <a:off x="504000" y="1768680"/>
+            <a:ext cx="4426920" cy="2090880"/>
           </a:xfrm>
           <a:prstGeom prst="rect">
             <a:avLst/>
@@ -863,7 +2018,7 @@
       </p:sp>
       <p:sp>
         <p:nvSpPr>
-          <p:cNvPr id="16" name="PlaceHolder 3"/>
+          <p:cNvPr id="13" name="PlaceHolder 3"/>
           <p:cNvSpPr>
             <a:spLocks noGrp="1"/>
           </p:cNvSpPr>
@@ -873,8 +2028,8 @@
         </p:nvSpPr>
         <p:spPr>
           <a:xfrm>
-            <a:off x="504000" y="4059360"/>
-            <a:ext cx="4426920" cy="2091240"/>
+            <a:off x="504000" y="4058640"/>
+            <a:ext cx="4426920" cy="2090880"/>
           </a:xfrm>
           <a:prstGeom prst="rect">
             <a:avLst/>
@@ -889,7 +2044,7 @@
       </p:sp>
       <p:sp>
         <p:nvSpPr>
-          <p:cNvPr id="17" name="PlaceHolder 4"/>
+          <p:cNvPr id="14" name="PlaceHolder 4"/>
           <p:cNvSpPr>
             <a:spLocks noGrp="1"/>
           </p:cNvSpPr>
@@ -899,8 +2054,8 @@
         </p:nvSpPr>
         <p:spPr>
           <a:xfrm>
-            <a:off x="5152680" y="1769040"/>
-            <a:ext cx="4426920" cy="4384440"/>
+            <a:off x="5152680" y="1768680"/>
+            <a:ext cx="4426920" cy="4384080"/>
           </a:xfrm>
           <a:prstGeom prst="rect">
             <a:avLst/>
@@ -937,7 +2092,7 @@
       </p:grpSpPr>
       <p:sp>
         <p:nvSpPr>
-          <p:cNvPr id="18" name="PlaceHolder 1"/>
+          <p:cNvPr id="15" name="PlaceHolder 1"/>
           <p:cNvSpPr>
             <a:spLocks noGrp="1"/>
           </p:cNvSpPr>
@@ -948,7 +2103,7 @@
         <p:spPr>
           <a:xfrm>
             <a:off x="504000" y="301320"/>
-            <a:ext cx="9071640" cy="1262160"/>
+            <a:ext cx="9072000" cy="1261800"/>
           </a:xfrm>
           <a:prstGeom prst="rect">
             <a:avLst/>
@@ -964,7 +2119,7 @@
       </p:sp>
       <p:sp>
         <p:nvSpPr>
-          <p:cNvPr id="19" name="PlaceHolder 2"/>
+          <p:cNvPr id="16" name="PlaceHolder 2"/>
           <p:cNvSpPr>
             <a:spLocks noGrp="1"/>
           </p:cNvSpPr>
@@ -974,8 +2129,8 @@
         </p:nvSpPr>
         <p:spPr>
           <a:xfrm>
-            <a:off x="504000" y="1769040"/>
-            <a:ext cx="4426920" cy="4384440"/>
+            <a:off x="504000" y="1768680"/>
+            <a:ext cx="4426920" cy="4384080"/>
           </a:xfrm>
           <a:prstGeom prst="rect">
             <a:avLst/>
@@ -990,7 +2145,7 @@
       </p:sp>
       <p:sp>
         <p:nvSpPr>
-          <p:cNvPr id="20" name="PlaceHolder 3"/>
+          <p:cNvPr id="17" name="PlaceHolder 3"/>
           <p:cNvSpPr>
             <a:spLocks noGrp="1"/>
           </p:cNvSpPr>
@@ -1000,8 +2155,8 @@
         </p:nvSpPr>
         <p:spPr>
           <a:xfrm>
-            <a:off x="5152680" y="1769040"/>
-            <a:ext cx="4426920" cy="2091240"/>
+            <a:off x="5152680" y="1768680"/>
+            <a:ext cx="4426920" cy="2090880"/>
           </a:xfrm>
           <a:prstGeom prst="rect">
             <a:avLst/>
@@ -1016,7 +2171,7 @@
       </p:sp>
       <p:sp>
         <p:nvSpPr>
-          <p:cNvPr id="21" name="PlaceHolder 4"/>
+          <p:cNvPr id="18" name="PlaceHolder 4"/>
           <p:cNvSpPr>
             <a:spLocks noGrp="1"/>
           </p:cNvSpPr>
@@ -1026,8 +2181,8 @@
         </p:nvSpPr>
         <p:spPr>
           <a:xfrm>
-            <a:off x="5152680" y="4059360"/>
-            <a:ext cx="4426920" cy="2091240"/>
+            <a:off x="5152680" y="4058640"/>
+            <a:ext cx="4426920" cy="2090880"/>
           </a:xfrm>
           <a:prstGeom prst="rect">
             <a:avLst/>
@@ -1064,7 +2219,7 @@
       </p:grpSpPr>
       <p:sp>
         <p:nvSpPr>
-          <p:cNvPr id="22" name="PlaceHolder 1"/>
+          <p:cNvPr id="19" name="PlaceHolder 1"/>
           <p:cNvSpPr>
             <a:spLocks noGrp="1"/>
           </p:cNvSpPr>
@@ -1075,7 +2230,7 @@
         <p:spPr>
           <a:xfrm>
             <a:off x="504000" y="301320"/>
-            <a:ext cx="9071640" cy="1262160"/>
+            <a:ext cx="9072000" cy="1261800"/>
           </a:xfrm>
           <a:prstGeom prst="rect">
             <a:avLst/>
@@ -1091,7 +2246,7 @@
       </p:sp>
       <p:sp>
         <p:nvSpPr>
-          <p:cNvPr id="23" name="PlaceHolder 2"/>
+          <p:cNvPr id="20" name="PlaceHolder 2"/>
           <p:cNvSpPr>
             <a:spLocks noGrp="1"/>
           </p:cNvSpPr>
@@ -1101,8 +2256,8 @@
         </p:nvSpPr>
         <p:spPr>
           <a:xfrm>
-            <a:off x="504000" y="1769040"/>
-            <a:ext cx="4426920" cy="2091240"/>
+            <a:off x="504000" y="1768680"/>
+            <a:ext cx="4426920" cy="2090880"/>
           </a:xfrm>
           <a:prstGeom prst="rect">
             <a:avLst/>
@@ -1117,7 +2272,7 @@
       </p:sp>
       <p:sp>
         <p:nvSpPr>
-          <p:cNvPr id="24" name="PlaceHolder 3"/>
+          <p:cNvPr id="21" name="PlaceHolder 3"/>
           <p:cNvSpPr>
             <a:spLocks noGrp="1"/>
           </p:cNvSpPr>
@@ -1127,8 +2282,8 @@
         </p:nvSpPr>
         <p:spPr>
           <a:xfrm>
-            <a:off x="5152680" y="1769040"/>
-            <a:ext cx="4426920" cy="2091240"/>
+            <a:off x="5152680" y="1768680"/>
+            <a:ext cx="4426920" cy="2090880"/>
           </a:xfrm>
           <a:prstGeom prst="rect">
             <a:avLst/>
@@ -1143,7 +2298,7 @@
       </p:sp>
       <p:sp>
         <p:nvSpPr>
-          <p:cNvPr id="25" name="PlaceHolder 4"/>
+          <p:cNvPr id="22" name="PlaceHolder 4"/>
           <p:cNvSpPr>
             <a:spLocks noGrp="1"/>
           </p:cNvSpPr>
@@ -1153,8 +2308,8 @@
         </p:nvSpPr>
         <p:spPr>
           <a:xfrm>
-            <a:off x="504000" y="4059360"/>
-            <a:ext cx="9071640" cy="2091240"/>
+            <a:off x="504000" y="4058640"/>
+            <a:ext cx="9072000" cy="2090880"/>
           </a:xfrm>
           <a:prstGeom prst="rect">
             <a:avLst/>
@@ -1202,7 +2357,7 @@
         <p:spPr>
           <a:xfrm>
             <a:off x="504000" y="301320"/>
-            <a:ext cx="9071640" cy="1262160"/>
+            <a:ext cx="9070920" cy="1261440"/>
           </a:xfrm>
           <a:prstGeom prst="rect">
             <a:avLst/>
@@ -1212,12 +2367,6 @@
           <a:bodyPr lIns="0" rIns="0" tIns="0" bIns="0" anchor="ctr"/>
           <a:p>
             <a:pPr algn="ctr"/>
-            <a:r>
-              <a:rPr lang="en-US" sz="4400">
-                <a:latin typeface="Arial"/>
-              </a:rPr>
-              <a:t>Clique para editar o formato do texto do título</a:t>
-            </a:r>
             <a:endParaRPr/>
           </a:p>
         </p:txBody>
@@ -1235,7 +2384,7 @@
         <p:spPr>
           <a:xfrm>
             <a:off x="504000" y="1769040"/>
-            <a:ext cx="9071640" cy="4384440"/>
+            <a:ext cx="9070920" cy="4383720"/>
           </a:xfrm>
           <a:prstGeom prst="rect">
             <a:avLst/>
@@ -1250,7 +2399,7 @@
               <a:buChar char=""/>
             </a:pPr>
             <a:r>
-              <a:rPr lang="en-US" sz="3200">
+              <a:rPr lang="en-US">
                 <a:latin typeface="Arial"/>
               </a:rPr>
               <a:t>Clique para editar o formato do texto da estrutura de tópicos</a:t>
@@ -1264,7 +2413,7 @@
               <a:buChar char=""/>
             </a:pPr>
             <a:r>
-              <a:rPr lang="en-US" sz="2800">
+              <a:rPr lang="en-US">
                 <a:latin typeface="Arial"/>
               </a:rPr>
               <a:t>2.º nível da estrutura de tópicos</a:t>
@@ -1278,7 +2427,7 @@
               <a:buChar char=""/>
             </a:pPr>
             <a:r>
-              <a:rPr lang="en-US" sz="2400">
+              <a:rPr lang="en-US">
                 <a:latin typeface="Arial"/>
               </a:rPr>
               <a:t>3.º nível da estrutura de tópicos</a:t>
@@ -1292,7 +2441,7 @@
               <a:buChar char=""/>
             </a:pPr>
             <a:r>
-              <a:rPr lang="en-US" sz="2000">
+              <a:rPr lang="en-US">
                 <a:latin typeface="Arial"/>
               </a:rPr>
               <a:t>4.º nível da estrutura de tópicos</a:t>
@@ -1306,7 +2455,7 @@
               <a:buChar char=""/>
             </a:pPr>
             <a:r>
-              <a:rPr lang="en-US" sz="2000">
+              <a:rPr lang="en-US">
                 <a:latin typeface="Arial"/>
               </a:rPr>
               <a:t>5.º nível da estrutura de tópicos</a:t>
@@ -1320,7 +2469,7 @@
               <a:buChar char=""/>
             </a:pPr>
             <a:r>
-              <a:rPr lang="en-US" sz="2000">
+              <a:rPr lang="en-US">
                 <a:latin typeface="Arial"/>
               </a:rPr>
               <a:t>6.º nível da estrutura de tópicos</a:t>
@@ -1334,109 +2483,11 @@
               <a:buChar char=""/>
             </a:pPr>
             <a:r>
-              <a:rPr lang="en-US" sz="2000">
+              <a:rPr lang="en-US">
                 <a:latin typeface="Arial"/>
               </a:rPr>
               <a:t>7.º nível da estrutura de tópicos</a:t>
             </a:r>
-            <a:endParaRPr/>
-          </a:p>
-        </p:txBody>
-      </p:sp>
-      <p:sp>
-        <p:nvSpPr>
-          <p:cNvPr id="2" name="PlaceHolder 3"/>
-          <p:cNvSpPr>
-            <a:spLocks noGrp="1"/>
-          </p:cNvSpPr>
-          <p:nvPr>
-            <p:ph type="dt"/>
-          </p:nvPr>
-        </p:nvSpPr>
-        <p:spPr>
-          <a:xfrm>
-            <a:off x="504000" y="6887160"/>
-            <a:ext cx="2348280" cy="521280"/>
-          </a:xfrm>
-          <a:prstGeom prst="rect">
-            <a:avLst/>
-          </a:prstGeom>
-        </p:spPr>
-        <p:txBody>
-          <a:bodyPr lIns="0" rIns="0" tIns="0" bIns="0"/>
-          <a:p>
-            <a:r>
-              <a:rPr lang="en-US" sz="1400">
-                <a:latin typeface="Times New Roman"/>
-              </a:rPr>
-              <a:t>&lt;data/hora&gt;</a:t>
-            </a:r>
-            <a:endParaRPr/>
-          </a:p>
-        </p:txBody>
-      </p:sp>
-      <p:sp>
-        <p:nvSpPr>
-          <p:cNvPr id="3" name="PlaceHolder 4"/>
-          <p:cNvSpPr>
-            <a:spLocks noGrp="1"/>
-          </p:cNvSpPr>
-          <p:nvPr>
-            <p:ph type="ftr"/>
-          </p:nvPr>
-        </p:nvSpPr>
-        <p:spPr>
-          <a:xfrm>
-            <a:off x="3447360" y="6887160"/>
-            <a:ext cx="3195000" cy="521280"/>
-          </a:xfrm>
-          <a:prstGeom prst="rect">
-            <a:avLst/>
-          </a:prstGeom>
-        </p:spPr>
-        <p:txBody>
-          <a:bodyPr lIns="0" rIns="0" tIns="0" bIns="0"/>
-          <a:p>
-            <a:pPr algn="ctr"/>
-            <a:r>
-              <a:rPr lang="en-US" sz="1400">
-                <a:latin typeface="Times New Roman"/>
-              </a:rPr>
-              <a:t>&lt;rodapé&gt;</a:t>
-            </a:r>
-            <a:endParaRPr/>
-          </a:p>
-        </p:txBody>
-      </p:sp>
-      <p:sp>
-        <p:nvSpPr>
-          <p:cNvPr id="4" name="PlaceHolder 5"/>
-          <p:cNvSpPr>
-            <a:spLocks noGrp="1"/>
-          </p:cNvSpPr>
-          <p:nvPr>
-            <p:ph type="sldNum"/>
-          </p:nvPr>
-        </p:nvSpPr>
-        <p:spPr>
-          <a:xfrm>
-            <a:off x="7227360" y="6887160"/>
-            <a:ext cx="2348280" cy="521280"/>
-          </a:xfrm>
-          <a:prstGeom prst="rect">
-            <a:avLst/>
-          </a:prstGeom>
-        </p:spPr>
-        <p:txBody>
-          <a:bodyPr lIns="0" rIns="0" tIns="0" bIns="0"/>
-          <a:p>
-            <a:pPr algn="r"/>
-            <a:fld id="{26A00DB9-D304-456A-807B-AD610D7FF026}" type="slidenum">
-              <a:rPr lang="en-US" sz="1400">
-                <a:latin typeface="Times New Roman"/>
-              </a:rPr>
-              <a:t>&lt;número&gt;</a:t>
-            </a:fld>
             <a:endParaRPr/>
           </a:p>
         </p:txBody>
@@ -1457,6 +2508,197 @@
     <p:sldLayoutId id="2147483658" r:id="rId11"/>
     <p:sldLayoutId id="2147483659" r:id="rId12"/>
     <p:sldLayoutId id="2147483660" r:id="rId13"/>
+  </p:sldLayoutIdLst>
+</p:sldMaster>
+</file>
+
+<file path=ppt/slideMasters/slideMaster2.xml><?xml version="1.0" encoding="utf-8"?>
+<p:sldMaster xmlns:a="http://schemas.openxmlformats.org/drawingml/2006/main" xmlns:p="http://schemas.openxmlformats.org/presentationml/2006/main" xmlns:r="http://schemas.openxmlformats.org/officeDocument/2006/relationships">
+  <p:cSld>
+    <p:spTree>
+      <p:nvGrpSpPr>
+        <p:cNvPr id="1" name=""/>
+        <p:cNvGrpSpPr/>
+        <p:nvPr/>
+      </p:nvGrpSpPr>
+      <p:grpSpPr>
+        <a:xfrm>
+          <a:off x="0" y="0"/>
+          <a:ext cx="0" cy="0"/>
+          <a:chOff x="0" y="0"/>
+          <a:chExt cx="0" cy="0"/>
+        </a:xfrm>
+      </p:grpSpPr>
+      <p:sp>
+        <p:nvSpPr>
+          <p:cNvPr id="36" name="PlaceHolder 1"/>
+          <p:cNvSpPr>
+            <a:spLocks noGrp="1"/>
+          </p:cNvSpPr>
+          <p:nvPr>
+            <p:ph type="title"/>
+          </p:nvPr>
+        </p:nvSpPr>
+        <p:spPr>
+          <a:xfrm>
+            <a:off x="504000" y="301320"/>
+            <a:ext cx="9072000" cy="1261800"/>
+          </a:xfrm>
+          <a:prstGeom prst="rect">
+            <a:avLst/>
+          </a:prstGeom>
+        </p:spPr>
+        <p:txBody>
+          <a:bodyPr lIns="0" rIns="0" tIns="0" bIns="0" anchor="ctr"/>
+          <a:p>
+            <a:pPr algn="ctr"/>
+            <a:r>
+              <a:rPr lang="en-US" sz="4400">
+                <a:latin typeface="Arial"/>
+              </a:rPr>
+              <a:t>Clique para editar o formato do texto do título</a:t>
+            </a:r>
+            <a:endParaRPr/>
+          </a:p>
+        </p:txBody>
+      </p:sp>
+      <p:sp>
+        <p:nvSpPr>
+          <p:cNvPr id="37" name="PlaceHolder 2"/>
+          <p:cNvSpPr>
+            <a:spLocks noGrp="1"/>
+          </p:cNvSpPr>
+          <p:nvPr>
+            <p:ph type="body"/>
+          </p:nvPr>
+        </p:nvSpPr>
+        <p:spPr>
+          <a:xfrm>
+            <a:off x="504000" y="1768680"/>
+            <a:ext cx="9072000" cy="4384080"/>
+          </a:xfrm>
+          <a:prstGeom prst="rect">
+            <a:avLst/>
+          </a:prstGeom>
+        </p:spPr>
+        <p:txBody>
+          <a:bodyPr lIns="0" rIns="0" tIns="0" bIns="0"/>
+          <a:p>
+            <a:pPr>
+              <a:buSzPct val="45000"/>
+              <a:buFont typeface="StarSymbol"/>
+              <a:buChar char=""/>
+            </a:pPr>
+            <a:r>
+              <a:rPr lang="en-US" sz="3200">
+                <a:latin typeface="Arial"/>
+              </a:rPr>
+              <a:t>Clique para editar o formato do texto da estrutura de tópicos</a:t>
+            </a:r>
+            <a:endParaRPr/>
+          </a:p>
+          <a:p>
+            <a:pPr lvl="1">
+              <a:buSzPct val="75000"/>
+              <a:buFont typeface="StarSymbol"/>
+              <a:buChar char=""/>
+            </a:pPr>
+            <a:r>
+              <a:rPr lang="en-US" sz="2800">
+                <a:latin typeface="Arial"/>
+              </a:rPr>
+              <a:t>2.º nível da estrutura de tópicos</a:t>
+            </a:r>
+            <a:endParaRPr/>
+          </a:p>
+          <a:p>
+            <a:pPr lvl="2">
+              <a:buSzPct val="45000"/>
+              <a:buFont typeface="StarSymbol"/>
+              <a:buChar char=""/>
+            </a:pPr>
+            <a:r>
+              <a:rPr lang="en-US" sz="2400">
+                <a:latin typeface="Arial"/>
+              </a:rPr>
+              <a:t>3.º nível da estrutura de tópicos</a:t>
+            </a:r>
+            <a:endParaRPr/>
+          </a:p>
+          <a:p>
+            <a:pPr lvl="3">
+              <a:buSzPct val="75000"/>
+              <a:buFont typeface="StarSymbol"/>
+              <a:buChar char=""/>
+            </a:pPr>
+            <a:r>
+              <a:rPr lang="en-US" sz="2000">
+                <a:latin typeface="Arial"/>
+              </a:rPr>
+              <a:t>4.º nível da estrutura de tópicos</a:t>
+            </a:r>
+            <a:endParaRPr/>
+          </a:p>
+          <a:p>
+            <a:pPr lvl="4">
+              <a:buSzPct val="45000"/>
+              <a:buFont typeface="StarSymbol"/>
+              <a:buChar char=""/>
+            </a:pPr>
+            <a:r>
+              <a:rPr lang="en-US" sz="2000">
+                <a:latin typeface="Arial"/>
+              </a:rPr>
+              <a:t>5.º nível da estrutura de tópicos</a:t>
+            </a:r>
+            <a:endParaRPr/>
+          </a:p>
+          <a:p>
+            <a:pPr lvl="5">
+              <a:buSzPct val="45000"/>
+              <a:buFont typeface="StarSymbol"/>
+              <a:buChar char=""/>
+            </a:pPr>
+            <a:r>
+              <a:rPr lang="en-US" sz="2000">
+                <a:latin typeface="Arial"/>
+              </a:rPr>
+              <a:t>6.º nível da estrutura de tópicos</a:t>
+            </a:r>
+            <a:endParaRPr/>
+          </a:p>
+          <a:p>
+            <a:pPr lvl="6">
+              <a:buSzPct val="45000"/>
+              <a:buFont typeface="StarSymbol"/>
+              <a:buChar char=""/>
+            </a:pPr>
+            <a:r>
+              <a:rPr lang="en-US" sz="2000">
+                <a:latin typeface="Arial"/>
+              </a:rPr>
+              <a:t>7.º nível da estrutura de tópicos</a:t>
+            </a:r>
+            <a:endParaRPr/>
+          </a:p>
+        </p:txBody>
+      </p:sp>
+    </p:spTree>
+  </p:cSld>
+  <p:clrMap bg1="lt1" bg2="lt2" tx1="dk1" tx2="dk2" accent1="accent1" accent2="accent2" accent3="accent3" accent4="accent4" accent5="accent5" accent6="accent6" hlink="hlink" folHlink="folHlink"/>
+  <p:sldLayoutIdLst>
+    <p:sldLayoutId id="2147483662" r:id="rId2"/>
+    <p:sldLayoutId id="2147483663" r:id="rId3"/>
+    <p:sldLayoutId id="2147483664" r:id="rId4"/>
+    <p:sldLayoutId id="2147483665" r:id="rId5"/>
+    <p:sldLayoutId id="2147483666" r:id="rId6"/>
+    <p:sldLayoutId id="2147483667" r:id="rId7"/>
+    <p:sldLayoutId id="2147483668" r:id="rId8"/>
+    <p:sldLayoutId id="2147483669" r:id="rId9"/>
+    <p:sldLayoutId id="2147483670" r:id="rId10"/>
+    <p:sldLayoutId id="2147483671" r:id="rId11"/>
+    <p:sldLayoutId id="2147483672" r:id="rId12"/>
+    <p:sldLayoutId id="2147483673" r:id="rId13"/>
   </p:sldLayoutIdLst>
 </p:sldMaster>
 </file>
@@ -1480,14 +2722,14 @@
       </p:grpSpPr>
       <p:sp>
         <p:nvSpPr>
-          <p:cNvPr id="39" name="TextShape 1"/>
-          <p:cNvSpPr txBox="1"/>
+          <p:cNvPr id="72" name="CustomShape 1"/>
+          <p:cNvSpPr/>
           <p:nvPr/>
         </p:nvSpPr>
         <p:spPr>
           <a:xfrm>
             <a:off x="504000" y="301320"/>
-            <a:ext cx="9071640" cy="1262160"/>
+            <a:ext cx="9070920" cy="1261440"/>
           </a:xfrm>
           <a:prstGeom prst="rect">
             <a:avLst/>
@@ -1497,13 +2739,27 @@
             <a:noFill/>
           </a:ln>
         </p:spPr>
+        <p:style>
+          <a:lnRef idx="0"/>
+          <a:fillRef idx="0"/>
+          <a:effectRef idx="0"/>
+          <a:fontRef idx="minor"/>
+        </p:style>
         <p:txBody>
           <a:bodyPr lIns="0" rIns="0" tIns="0" bIns="0" anchor="ctr"/>
           <a:p>
-            <a:pPr algn="ctr"/>
+            <a:pPr algn="ctr">
+              <a:lnSpc>
+                <a:spcPct val="100000"/>
+              </a:lnSpc>
+            </a:pPr>
             <a:r>
-              <a:rPr lang="en-US" sz="4400">
+              <a:rPr lang="en-US" sz="4400" strike="noStrike">
+                <a:solidFill>
+                  <a:srgbClr val="000000"/>
+                </a:solidFill>
                 <a:latin typeface="Arial"/>
+                <a:ea typeface="DejaVu Sans"/>
               </a:rPr>
               <a:t>smartTextureMap</a:t>
             </a:r>
@@ -1513,14 +2769,14 @@
       </p:sp>
       <p:sp>
         <p:nvSpPr>
-          <p:cNvPr id="40" name="TextShape 2"/>
-          <p:cNvSpPr txBox="1"/>
+          <p:cNvPr id="73" name="CustomShape 2"/>
+          <p:cNvSpPr/>
           <p:nvPr/>
         </p:nvSpPr>
         <p:spPr>
           <a:xfrm>
             <a:off x="504000" y="1769040"/>
-            <a:ext cx="9071640" cy="4384440"/>
+            <a:ext cx="9070920" cy="1705680"/>
           </a:xfrm>
           <a:prstGeom prst="rect">
             <a:avLst/>
@@ -1530,13 +2786,27 @@
             <a:noFill/>
           </a:ln>
         </p:spPr>
+        <p:style>
+          <a:lnRef idx="0"/>
+          <a:fillRef idx="0"/>
+          <a:effectRef idx="0"/>
+          <a:fontRef idx="minor"/>
+        </p:style>
         <p:txBody>
           <a:bodyPr lIns="0" rIns="0" tIns="0" bIns="0" anchor="ctr"/>
           <a:p>
-            <a:pPr algn="ctr"/>
+            <a:pPr algn="ctr">
+              <a:lnSpc>
+                <a:spcPct val="100000"/>
+              </a:lnSpc>
+            </a:pPr>
             <a:r>
-              <a:rPr lang="en-US" sz="3200">
+              <a:rPr lang="en-US" sz="3200" strike="noStrike">
+                <a:solidFill>
+                  <a:srgbClr val="000000"/>
+                </a:solidFill>
                 <a:latin typeface="Arial"/>
+                <a:ea typeface="DejaVu Sans"/>
               </a:rPr>
               <a:t>Guide – Pass less time organizing texture map identifying its faces!</a:t>
             </a:r>
@@ -1544,6 +2814,75 @@
           </a:p>
         </p:txBody>
       </p:sp>
+      <p:pic>
+        <p:nvPicPr>
+          <p:cNvPr id="74" name="" descr=""/>
+          <p:cNvPicPr/>
+          <p:nvPr/>
+        </p:nvPicPr>
+        <p:blipFill>
+          <a:blip r:embed="rId1"/>
+          <a:stretch/>
+        </p:blipFill>
+        <p:spPr>
+          <a:xfrm>
+            <a:off x="914400" y="3291840"/>
+            <a:ext cx="2103120" cy="2103120"/>
+          </a:xfrm>
+          <a:prstGeom prst="rect">
+            <a:avLst/>
+          </a:prstGeom>
+          <a:ln>
+            <a:noFill/>
+          </a:ln>
+        </p:spPr>
+      </p:pic>
+      <p:pic>
+        <p:nvPicPr>
+          <p:cNvPr id="75" name="" descr=""/>
+          <p:cNvPicPr/>
+          <p:nvPr/>
+        </p:nvPicPr>
+        <p:blipFill>
+          <a:blip r:embed="rId2"/>
+          <a:stretch/>
+        </p:blipFill>
+        <p:spPr>
+          <a:xfrm>
+            <a:off x="6583680" y="3366720"/>
+            <a:ext cx="1920240" cy="1845360"/>
+          </a:xfrm>
+          <a:prstGeom prst="rect">
+            <a:avLst/>
+          </a:prstGeom>
+          <a:ln>
+            <a:noFill/>
+          </a:ln>
+        </p:spPr>
+      </p:pic>
+      <p:pic>
+        <p:nvPicPr>
+          <p:cNvPr id="76" name="" descr=""/>
+          <p:cNvPicPr/>
+          <p:nvPr/>
+        </p:nvPicPr>
+        <p:blipFill>
+          <a:blip r:embed="rId3"/>
+          <a:stretch/>
+        </p:blipFill>
+        <p:spPr>
+          <a:xfrm>
+            <a:off x="3318120" y="5577840"/>
+            <a:ext cx="3539880" cy="1710720"/>
+          </a:xfrm>
+          <a:prstGeom prst="rect">
+            <a:avLst/>
+          </a:prstGeom>
+          <a:ln>
+            <a:noFill/>
+          </a:ln>
+        </p:spPr>
+      </p:pic>
     </p:spTree>
   </p:cSld>
   <p:timing>
@@ -1595,14 +2934,14 @@
       </p:grpSpPr>
       <p:sp>
         <p:nvSpPr>
-          <p:cNvPr id="41" name="TextShape 1"/>
-          <p:cNvSpPr txBox="1"/>
+          <p:cNvPr id="77" name="CustomShape 1"/>
+          <p:cNvSpPr/>
           <p:nvPr/>
         </p:nvSpPr>
         <p:spPr>
           <a:xfrm>
             <a:off x="504000" y="301320"/>
-            <a:ext cx="9071640" cy="1262160"/>
+            <a:ext cx="9070920" cy="1261440"/>
           </a:xfrm>
           <a:prstGeom prst="rect">
             <a:avLst/>
@@ -1612,13 +2951,27 @@
             <a:noFill/>
           </a:ln>
         </p:spPr>
+        <p:style>
+          <a:lnRef idx="0"/>
+          <a:fillRef idx="0"/>
+          <a:effectRef idx="0"/>
+          <a:fontRef idx="minor"/>
+        </p:style>
         <p:txBody>
           <a:bodyPr lIns="0" rIns="0" tIns="0" bIns="0" anchor="ctr"/>
           <a:p>
-            <a:pPr algn="ctr"/>
+            <a:pPr algn="ctr">
+              <a:lnSpc>
+                <a:spcPct val="100000"/>
+              </a:lnSpc>
+            </a:pPr>
             <a:r>
-              <a:rPr lang="en-US" sz="2800">
+              <a:rPr lang="en-US" sz="2800" strike="noStrike">
+                <a:solidFill>
+                  <a:srgbClr val="000000"/>
+                </a:solidFill>
                 <a:latin typeface="Arial"/>
+                <a:ea typeface="DejaVu Sans"/>
               </a:rPr>
               <a:t>1) Export the texture map in Blender, or in your 3D modeler preferred</a:t>
             </a:r>
@@ -1628,14 +2981,14 @@
       </p:sp>
       <p:sp>
         <p:nvSpPr>
-          <p:cNvPr id="42" name="TextShape 2"/>
-          <p:cNvSpPr txBox="1"/>
+          <p:cNvPr id="78" name="CustomShape 2"/>
+          <p:cNvSpPr/>
           <p:nvPr/>
         </p:nvSpPr>
         <p:spPr>
           <a:xfrm>
             <a:off x="504000" y="1769040"/>
-            <a:ext cx="9071640" cy="4384440"/>
+            <a:ext cx="9070920" cy="4383720"/>
           </a:xfrm>
           <a:prstGeom prst="rect">
             <a:avLst/>
@@ -1645,16 +2998,16 @@
             <a:noFill/>
           </a:ln>
         </p:spPr>
-        <p:txBody>
-          <a:bodyPr lIns="0" rIns="0" tIns="0" bIns="0"/>
-          <a:p>
-            <a:endParaRPr/>
-          </a:p>
-        </p:txBody>
+        <p:style>
+          <a:lnRef idx="0"/>
+          <a:fillRef idx="0"/>
+          <a:effectRef idx="0"/>
+          <a:fontRef idx="minor"/>
+        </p:style>
       </p:sp>
       <p:pic>
         <p:nvPicPr>
-          <p:cNvPr id="43" name="" descr=""/>
+          <p:cNvPr id="79" name="" descr=""/>
           <p:cNvPicPr/>
           <p:nvPr/>
         </p:nvPicPr>
@@ -1665,7 +3018,7 @@
         <p:spPr>
           <a:xfrm>
             <a:off x="597600" y="1371600"/>
-            <a:ext cx="8454960" cy="5286600"/>
+            <a:ext cx="8454240" cy="5285880"/>
           </a:xfrm>
           <a:prstGeom prst="rect">
             <a:avLst/>
@@ -1726,14 +3079,14 @@
       </p:grpSpPr>
       <p:sp>
         <p:nvSpPr>
-          <p:cNvPr id="44" name="TextShape 1"/>
-          <p:cNvSpPr txBox="1"/>
+          <p:cNvPr id="80" name="CustomShape 1"/>
+          <p:cNvSpPr/>
           <p:nvPr/>
         </p:nvSpPr>
         <p:spPr>
           <a:xfrm>
             <a:off x="548640" y="365040"/>
-            <a:ext cx="8888760" cy="1189440"/>
+            <a:ext cx="8888040" cy="1188720"/>
           </a:xfrm>
           <a:prstGeom prst="rect">
             <a:avLst/>
@@ -1743,34 +3096,152 @@
             <a:noFill/>
           </a:ln>
         </p:spPr>
+        <p:style>
+          <a:lnRef idx="0"/>
+          <a:fillRef idx="0"/>
+          <a:effectRef idx="0"/>
+          <a:fontRef idx="minor"/>
+        </p:style>
         <p:txBody>
           <a:bodyPr lIns="0" rIns="0" tIns="0" bIns="0" anchor="ctr"/>
           <a:p>
             <a:r>
-              <a:rPr lang="en-US" sz="2800">
+              <a:rPr lang="en-US" sz="2800" strike="noStrike">
+                <a:solidFill>
+                  <a:srgbClr val="000000"/>
+                </a:solidFill>
                 <a:latin typeface="Arial"/>
+                <a:ea typeface="DejaVu Sans"/>
               </a:rPr>
-              <a:t>2) Uses </a:t>
+              <a:t>2) Run smartTextureMap. You have two options: </a:t>
             </a:r>
-            <a:r>
-              <a:rPr b="1" lang="en-US" sz="2800">
-                <a:latin typeface="Arial"/>
-              </a:rPr>
-              <a:t>smartTextureMap</a:t>
-            </a:r>
-            <a:r>
-              <a:rPr lang="en-US" sz="2800">
-                <a:latin typeface="Arial"/>
-              </a:rPr>
-              <a:t> from Windows Command Prompt to identify the faces, indicating the fullpath of file exported.</a:t>
-            </a:r>
-            <a:endParaRPr/>
-          </a:p>
-        </p:txBody>
-      </p:sp>
+            <a:endParaRPr/>
+          </a:p>
+          <a:p>
+            <a:endParaRPr/>
+          </a:p>
+          <a:p>
+            <a:endParaRPr/>
+          </a:p>
+        </p:txBody>
+      </p:sp>
+      <p:graphicFrame>
+        <p:nvGraphicFramePr>
+          <p:cNvPr id="81" name="Table 2"/>
+          <p:cNvGraphicFramePr/>
+          <p:nvPr/>
+        </p:nvGraphicFramePr>
+        <p:xfrm>
+          <a:off x="685440" y="1140480"/>
+          <a:ext cx="9098280" cy="4163040"/>
+        </p:xfrm>
+        <a:graphic>
+          <a:graphicData uri="http://schemas.openxmlformats.org/drawingml/2006/table">
+            <a:tbl>
+              <a:tblPr/>
+              <a:tblGrid>
+                <a:gridCol w="4548600"/>
+                <a:gridCol w="4550040"/>
+              </a:tblGrid>
+              <a:tr h="4163040">
+                <a:tc>
+                  <a:txBody>
+                    <a:bodyPr/>
+                    <a:p>
+                      <a:r>
+                        <a:rPr b="1" lang="en-US" strike="noStrike">
+                          <a:latin typeface="Arial"/>
+                        </a:rPr>
+                        <a:t>Windows Command Prompt</a:t>
+                      </a:r>
+                      <a:r>
+                        <a:rPr lang="en-US" strike="noStrike">
+                          <a:latin typeface="Arial"/>
+                        </a:rPr>
+                        <a:t> - Uses </a:t>
+                      </a:r>
+                      <a:r>
+                        <a:rPr b="1" lang="en-US" strike="noStrike">
+                          <a:latin typeface="Arial"/>
+                        </a:rPr>
+                        <a:t>smartTextureMap</a:t>
+                      </a:r>
+                      <a:r>
+                        <a:rPr lang="en-US" strike="noStrike">
+                          <a:latin typeface="Arial"/>
+                        </a:rPr>
+                        <a:t> from Windows Command Prompt to identify the faces, indicating the full path of file exported.</a:t>
+                      </a:r>
+                      <a:endParaRPr/>
+                    </a:p>
+                    <a:p>
+                      <a:endParaRPr/>
+                    </a:p>
+                    <a:p>
+                      <a:r>
+                        <a:rPr lang="en-US" strike="noStrike">
+                          <a:latin typeface="Arial"/>
+                        </a:rPr>
+                        <a:t>Ex.:</a:t>
+                      </a:r>
+                      <a:endParaRPr/>
+                    </a:p>
+                    <a:p>
+                      <a:endParaRPr/>
+                    </a:p>
+                    <a:p>
+                      <a:r>
+                        <a:rPr b="1" lang="en-US" strike="noStrike">
+                          <a:latin typeface="Arial"/>
+                        </a:rPr>
+                        <a:t>smartTextureMap MyTexture.png</a:t>
+                      </a:r>
+                      <a:endParaRPr/>
+                    </a:p>
+                  </a:txBody>
+                  <a:tcPr/>
+                </a:tc>
+                <a:tc>
+                  <a:txBody>
+                    <a:bodyPr/>
+                    <a:p>
+                      <a:r>
+                        <a:rPr b="1" lang="en-US" strike="noStrike">
+                          <a:latin typeface="Arial"/>
+                        </a:rPr>
+                        <a:t>Windows 10</a:t>
+                      </a:r>
+                      <a:r>
+                        <a:rPr lang="en-US" strike="noStrike">
+                          <a:latin typeface="Arial"/>
+                        </a:rPr>
+                        <a:t> – Give a double click from Windows Explorer in </a:t>
+                      </a:r>
+                      <a:r>
+                        <a:rPr b="1" lang="en-US" strike="noStrike">
+                          <a:latin typeface="Arial"/>
+                        </a:rPr>
+                        <a:t>smartTextureMap.exe</a:t>
+                      </a:r>
+                      <a:r>
+                        <a:rPr lang="en-US" strike="noStrike">
+                          <a:latin typeface="Arial"/>
+                        </a:rPr>
+                        <a:t>, or from Windows Command Prompt without parameters</a:t>
+                      </a:r>
+                      <a:endParaRPr/>
+                    </a:p>
+                  </a:txBody>
+                  <a:tcPr/>
+                </a:tc>
+              </a:tr>
+            </a:tbl>
+          </a:graphicData>
+        </a:graphic>
+      </p:graphicFrame>
       <p:pic>
         <p:nvPicPr>
-          <p:cNvPr id="45" name="" descr=""/>
+          <p:cNvPr id="82" name="" descr=""/>
           <p:cNvPicPr/>
           <p:nvPr/>
         </p:nvPicPr>
@@ -1780,54 +3251,8 @@
         </p:blipFill>
         <p:spPr>
           <a:xfrm>
-            <a:off x="731520" y="3383280"/>
-            <a:ext cx="3108960" cy="3108960"/>
-          </a:xfrm>
-          <a:prstGeom prst="rect">
-            <a:avLst/>
-          </a:prstGeom>
-          <a:ln>
-            <a:noFill/>
-          </a:ln>
-        </p:spPr>
-      </p:pic>
-      <p:pic>
-        <p:nvPicPr>
-          <p:cNvPr id="46" name="" descr=""/>
-          <p:cNvPicPr/>
-          <p:nvPr/>
-        </p:nvPicPr>
-        <p:blipFill>
-          <a:blip r:embed="rId2"/>
-          <a:stretch/>
-        </p:blipFill>
-        <p:spPr>
-          <a:xfrm>
-            <a:off x="1097280" y="2328840"/>
-            <a:ext cx="8226000" cy="505800"/>
-          </a:xfrm>
-          <a:prstGeom prst="rect">
-            <a:avLst/>
-          </a:prstGeom>
-          <a:ln>
-            <a:noFill/>
-          </a:ln>
-        </p:spPr>
-      </p:pic>
-      <p:pic>
-        <p:nvPicPr>
-          <p:cNvPr id="47" name="" descr=""/>
-          <p:cNvPicPr/>
-          <p:nvPr/>
-        </p:nvPicPr>
-        <p:blipFill>
-          <a:blip r:embed="rId3"/>
-          <a:stretch/>
-        </p:blipFill>
-        <p:spPr>
-          <a:xfrm>
-            <a:off x="6274080" y="3378960"/>
-            <a:ext cx="3144240" cy="3021840"/>
+            <a:off x="5303520" y="3108960"/>
+            <a:ext cx="4326840" cy="2103120"/>
           </a:xfrm>
           <a:prstGeom prst="rect">
             <a:avLst/>
@@ -1888,14 +3313,14 @@
       </p:grpSpPr>
       <p:sp>
         <p:nvSpPr>
-          <p:cNvPr id="48" name="TextShape 1"/>
-          <p:cNvSpPr txBox="1"/>
+          <p:cNvPr id="83" name="CustomShape 1"/>
+          <p:cNvSpPr/>
           <p:nvPr/>
         </p:nvSpPr>
         <p:spPr>
           <a:xfrm>
             <a:off x="504000" y="301320"/>
-            <a:ext cx="9071640" cy="1262160"/>
+            <a:ext cx="9070920" cy="1261440"/>
           </a:xfrm>
           <a:prstGeom prst="rect">
             <a:avLst/>
@@ -1905,13 +3330,27 @@
             <a:noFill/>
           </a:ln>
         </p:spPr>
+        <p:style>
+          <a:lnRef idx="0"/>
+          <a:fillRef idx="0"/>
+          <a:effectRef idx="0"/>
+          <a:fontRef idx="minor"/>
+        </p:style>
         <p:txBody>
           <a:bodyPr lIns="0" rIns="0" tIns="0" bIns="0" anchor="ctr"/>
           <a:p>
-            <a:pPr algn="ctr"/>
+            <a:pPr algn="ctr">
+              <a:lnSpc>
+                <a:spcPct val="100000"/>
+              </a:lnSpc>
+            </a:pPr>
             <a:r>
-              <a:rPr lang="en-US" sz="4400">
+              <a:rPr lang="en-US" sz="4400" strike="noStrike">
+                <a:solidFill>
+                  <a:srgbClr val="000000"/>
+                </a:solidFill>
                 <a:latin typeface="Arial"/>
+                <a:ea typeface="DejaVu Sans"/>
               </a:rPr>
               <a:t>3) Reimport the new generated file (&lt;&lt;file&gt;&gt;.smartMap.&lt;&lt;png/bmp&gt;&gt;) </a:t>
             </a:r>
@@ -1921,7 +3360,7 @@
       </p:sp>
       <p:pic>
         <p:nvPicPr>
-          <p:cNvPr id="49" name="" descr=""/>
+          <p:cNvPr id="84" name="" descr=""/>
           <p:cNvPicPr/>
           <p:nvPr/>
         </p:nvPicPr>
@@ -1932,7 +3371,7 @@
         <p:spPr>
           <a:xfrm>
             <a:off x="504360" y="1769400"/>
-            <a:ext cx="9070920" cy="4383720"/>
+            <a:ext cx="9070200" cy="4383000"/>
           </a:xfrm>
           <a:prstGeom prst="rect">
             <a:avLst/>
@@ -1993,14 +3432,14 @@
       </p:grpSpPr>
       <p:sp>
         <p:nvSpPr>
-          <p:cNvPr id="50" name="TextShape 1"/>
-          <p:cNvSpPr txBox="1"/>
+          <p:cNvPr id="85" name="CustomShape 1"/>
+          <p:cNvSpPr/>
           <p:nvPr/>
         </p:nvSpPr>
         <p:spPr>
           <a:xfrm>
             <a:off x="504000" y="222840"/>
-            <a:ext cx="9071640" cy="1416960"/>
+            <a:ext cx="9070920" cy="1416240"/>
           </a:xfrm>
           <a:prstGeom prst="rect">
             <a:avLst/>
@@ -2010,33 +3449,43 @@
             <a:noFill/>
           </a:ln>
         </p:spPr>
+        <p:style>
+          <a:lnRef idx="0"/>
+          <a:fillRef idx="0"/>
+          <a:effectRef idx="0"/>
+          <a:fontRef idx="minor"/>
+        </p:style>
         <p:txBody>
           <a:bodyPr lIns="0" rIns="0" tIns="0" bIns="0" anchor="ctr"/>
           <a:p>
-            <a:pPr algn="ctr"/>
             <a:r>
-              <a:rPr lang="en-US" sz="2000">
+              <a:rPr lang="en-US" sz="2000" strike="noStrike">
+                <a:solidFill>
+                  <a:srgbClr val="000000"/>
+                </a:solidFill>
                 <a:latin typeface="Arial"/>
+                <a:ea typeface="DejaVu Sans"/>
               </a:rPr>
               <a:t>4) Using a photo editor (such as Photoshop or GimpShop), identify the faces. Paste the image above them. If they are upside-down in Blender (check how the letters looks like), rotate the image textures.</a:t>
             </a:r>
+            <a:endParaRPr/>
+          </a:p>
+          <a:p>
+            <a:endParaRPr/>
+          </a:p>
+          <a:p>
+            <a:pPr algn="ctr">
+              <a:lnSpc>
+                <a:spcPct val="100000"/>
+              </a:lnSpc>
+            </a:pPr>
             <a:r>
-              <a:rPr lang="en-US" sz="2000">
+              <a:rPr lang="en-US" sz="2000" strike="noStrike">
+                <a:solidFill>
+                  <a:srgbClr val="000000"/>
+                </a:solidFill>
                 <a:latin typeface="Arial"/>
-              </a:rPr>
-              <a:t>
-</a:t>
-            </a:r>
-            <a:r>
-              <a:rPr lang="en-US" sz="2000">
-                <a:latin typeface="Arial"/>
-              </a:rPr>
-              <a:t>
-</a:t>
-            </a:r>
-            <a:r>
-              <a:rPr lang="en-US" sz="2000">
-                <a:latin typeface="Arial"/>
+                <a:ea typeface="DejaVu Sans"/>
               </a:rPr>
               <a:t>(Use layers/canvas to gain versatility)</a:t>
             </a:r>
@@ -2046,7 +3495,7 @@
       </p:sp>
       <p:pic>
         <p:nvPicPr>
-          <p:cNvPr id="51" name="" descr=""/>
+          <p:cNvPr id="86" name="" descr=""/>
           <p:cNvPicPr/>
           <p:nvPr/>
         </p:nvPicPr>
@@ -2057,7 +3506,7 @@
         <p:spPr>
           <a:xfrm>
             <a:off x="822960" y="1828800"/>
-            <a:ext cx="8412480" cy="5259960"/>
+            <a:ext cx="8411760" cy="5259240"/>
           </a:xfrm>
           <a:prstGeom prst="rect">
             <a:avLst/>
@@ -2118,14 +3567,14 @@
       </p:grpSpPr>
       <p:sp>
         <p:nvSpPr>
-          <p:cNvPr id="52" name="TextShape 1"/>
-          <p:cNvSpPr txBox="1"/>
+          <p:cNvPr id="87" name="CustomShape 1"/>
+          <p:cNvSpPr/>
           <p:nvPr/>
         </p:nvSpPr>
         <p:spPr>
           <a:xfrm>
             <a:off x="504000" y="301320"/>
-            <a:ext cx="9071640" cy="1262160"/>
+            <a:ext cx="9070920" cy="1261440"/>
           </a:xfrm>
           <a:prstGeom prst="rect">
             <a:avLst/>
@@ -2135,13 +3584,27 @@
             <a:noFill/>
           </a:ln>
         </p:spPr>
+        <p:style>
+          <a:lnRef idx="0"/>
+          <a:fillRef idx="0"/>
+          <a:effectRef idx="0"/>
+          <a:fontRef idx="minor"/>
+        </p:style>
         <p:txBody>
           <a:bodyPr lIns="0" rIns="0" tIns="0" bIns="0" anchor="ctr"/>
           <a:p>
-            <a:pPr algn="ctr"/>
+            <a:pPr algn="ctr">
+              <a:lnSpc>
+                <a:spcPct val="100000"/>
+              </a:lnSpc>
+            </a:pPr>
             <a:r>
-              <a:rPr lang="en-US" sz="2600">
+              <a:rPr lang="en-US" sz="2600" strike="noStrike">
+                <a:solidFill>
+                  <a:srgbClr val="000000"/>
+                </a:solidFill>
                 <a:latin typeface="Arial"/>
+                <a:ea typeface="DejaVu Sans"/>
               </a:rPr>
               <a:t>5) Refresh image view in Blender and proceed to the rest of faces</a:t>
             </a:r>
@@ -2151,14 +3614,14 @@
       </p:sp>
       <p:sp>
         <p:nvSpPr>
-          <p:cNvPr id="53" name="TextShape 2"/>
-          <p:cNvSpPr txBox="1"/>
+          <p:cNvPr id="88" name="CustomShape 2"/>
+          <p:cNvSpPr/>
           <p:nvPr/>
         </p:nvSpPr>
         <p:spPr>
           <a:xfrm>
             <a:off x="504000" y="1769040"/>
-            <a:ext cx="9071640" cy="4384440"/>
+            <a:ext cx="9070920" cy="4383720"/>
           </a:xfrm>
           <a:prstGeom prst="rect">
             <a:avLst/>
@@ -2168,16 +3631,16 @@
             <a:noFill/>
           </a:ln>
         </p:spPr>
-        <p:txBody>
-          <a:bodyPr lIns="0" rIns="0" tIns="0" bIns="0"/>
-          <a:p>
-            <a:endParaRPr/>
-          </a:p>
-        </p:txBody>
+        <p:style>
+          <a:lnRef idx="0"/>
+          <a:fillRef idx="0"/>
+          <a:effectRef idx="0"/>
+          <a:fontRef idx="minor"/>
+        </p:style>
       </p:sp>
       <p:pic>
         <p:nvPicPr>
-          <p:cNvPr id="54" name="" descr=""/>
+          <p:cNvPr id="89" name="" descr=""/>
           <p:cNvPicPr/>
           <p:nvPr/>
         </p:nvPicPr>
@@ -2188,7 +3651,7 @@
         <p:spPr>
           <a:xfrm>
             <a:off x="278640" y="1383480"/>
-            <a:ext cx="9048240" cy="5657400"/>
+            <a:ext cx="9047520" cy="5656680"/>
           </a:xfrm>
           <a:prstGeom prst="rect">
             <a:avLst/>
@@ -2249,14 +3712,14 @@
       </p:grpSpPr>
       <p:sp>
         <p:nvSpPr>
-          <p:cNvPr id="55" name="TextShape 1"/>
-          <p:cNvSpPr txBox="1"/>
+          <p:cNvPr id="90" name="CustomShape 1"/>
+          <p:cNvSpPr/>
           <p:nvPr/>
         </p:nvSpPr>
         <p:spPr>
           <a:xfrm>
             <a:off x="504000" y="299880"/>
-            <a:ext cx="9071640" cy="1262160"/>
+            <a:ext cx="9070920" cy="1261440"/>
           </a:xfrm>
           <a:prstGeom prst="rect">
             <a:avLst/>
@@ -2266,13 +3729,27 @@
             <a:noFill/>
           </a:ln>
         </p:spPr>
+        <p:style>
+          <a:lnRef idx="0"/>
+          <a:fillRef idx="0"/>
+          <a:effectRef idx="0"/>
+          <a:fontRef idx="minor"/>
+        </p:style>
         <p:txBody>
           <a:bodyPr lIns="0" rIns="0" tIns="0" bIns="0" anchor="ctr"/>
           <a:p>
-            <a:pPr algn="ctr"/>
+            <a:pPr algn="ctr">
+              <a:lnSpc>
+                <a:spcPct val="100000"/>
+              </a:lnSpc>
+            </a:pPr>
             <a:r>
-              <a:rPr lang="en-US" sz="2200">
+              <a:rPr lang="en-US" sz="2200" strike="noStrike">
+                <a:solidFill>
+                  <a:srgbClr val="000000"/>
+                </a:solidFill>
                 <a:latin typeface="Arial"/>
+                <a:ea typeface="DejaVu Sans"/>
               </a:rPr>
               <a:t>6) It's up to you! Now you need to less travels between Image editor and 3D modeler. You even can avoid to map seams of modelers less important and concentrate in which it's really important.</a:t>
             </a:r>
@@ -2282,14 +3759,14 @@
       </p:sp>
       <p:sp>
         <p:nvSpPr>
-          <p:cNvPr id="56" name="TextShape 2"/>
-          <p:cNvSpPr txBox="1"/>
+          <p:cNvPr id="91" name="CustomShape 2"/>
+          <p:cNvSpPr/>
           <p:nvPr/>
         </p:nvSpPr>
         <p:spPr>
           <a:xfrm>
             <a:off x="504000" y="1769040"/>
-            <a:ext cx="9071640" cy="4384440"/>
+            <a:ext cx="9070920" cy="4383720"/>
           </a:xfrm>
           <a:prstGeom prst="rect">
             <a:avLst/>
@@ -2299,16 +3776,16 @@
             <a:noFill/>
           </a:ln>
         </p:spPr>
-        <p:txBody>
-          <a:bodyPr lIns="0" rIns="0" tIns="0" bIns="0"/>
-          <a:p>
-            <a:endParaRPr/>
-          </a:p>
-        </p:txBody>
+        <p:style>
+          <a:lnRef idx="0"/>
+          <a:fillRef idx="0"/>
+          <a:effectRef idx="0"/>
+          <a:fontRef idx="minor"/>
+        </p:style>
       </p:sp>
       <p:pic>
         <p:nvPicPr>
-          <p:cNvPr id="57" name="" descr=""/>
+          <p:cNvPr id="92" name="" descr=""/>
           <p:cNvPicPr/>
           <p:nvPr/>
         </p:nvPicPr>
@@ -2319,7 +3796,7 @@
         <p:spPr>
           <a:xfrm>
             <a:off x="278640" y="1645920"/>
-            <a:ext cx="9048240" cy="5657400"/>
+            <a:ext cx="9047520" cy="5656680"/>
           </a:xfrm>
           <a:prstGeom prst="rect">
             <a:avLst/>
@@ -2582,4 +4059,227 @@
     </a:fmtScheme>
   </a:themeElements>
 </a:theme>
+</file>
+
+<file path=ppt/theme/theme2.xml><?xml version="1.0" encoding="utf-8"?>
+<a:theme xmlns:a="http://schemas.openxmlformats.org/drawingml/2006/main" name="Office Theme">
+  <a:themeElements>
+    <a:clrScheme name="Office">
+      <a:dk1>
+        <a:sysClr val="windowText" lastClr="000000"/>
+      </a:dk1>
+      <a:lt1>
+        <a:sysClr val="window" lastClr="FFFFFF"/>
+      </a:lt1>
+      <a:dk2>
+        <a:srgbClr val="1F497D"/>
+      </a:dk2>
+      <a:lt2>
+        <a:srgbClr val="EEECE1"/>
+      </a:lt2>
+      <a:accent1>
+        <a:srgbClr val="4F81BD"/>
+      </a:accent1>
+      <a:accent2>
+        <a:srgbClr val="C0504D"/>
+      </a:accent2>
+      <a:accent3>
+        <a:srgbClr val="9BBB59"/>
+      </a:accent3>
+      <a:accent4>
+        <a:srgbClr val="8064A2"/>
+      </a:accent4>
+      <a:accent5>
+        <a:srgbClr val="4BACC6"/>
+      </a:accent5>
+      <a:accent6>
+        <a:srgbClr val="F79646"/>
+      </a:accent6>
+      <a:hlink>
+        <a:srgbClr val="0000FF"/>
+      </a:hlink>
+      <a:folHlink>
+        <a:srgbClr val="800080"/>
+      </a:folHlink>
+    </a:clrScheme>
+    <a:fontScheme name="Office">
+      <a:majorFont>
+        <a:latin typeface="Arial"/>
+        <a:ea typeface="DejaVu Sans"/>
+        <a:cs typeface="DejaVu Sans"/>
+      </a:majorFont>
+      <a:minorFont>
+        <a:latin typeface="Arial"/>
+        <a:ea typeface="DejaVu Sans"/>
+        <a:cs typeface="DejaVu Sans"/>
+      </a:minorFont>
+    </a:fontScheme>
+    <a:fmtScheme name="Office">
+      <a:fillStyleLst>
+        <a:solidFill>
+          <a:schemeClr val="phClr"/>
+        </a:solidFill>
+        <a:gradFill rotWithShape="1">
+          <a:gsLst>
+            <a:gs pos="0">
+              <a:schemeClr val="phClr">
+                <a:tint val="50000"/>
+                <a:satMod val="300000"/>
+              </a:schemeClr>
+            </a:gs>
+            <a:gs pos="35000">
+              <a:schemeClr val="phClr">
+                <a:tint val="37000"/>
+                <a:satMod val="300000"/>
+              </a:schemeClr>
+            </a:gs>
+            <a:gs pos="100000">
+              <a:schemeClr val="phClr">
+                <a:tint val="15000"/>
+                <a:satMod val="350000"/>
+              </a:schemeClr>
+            </a:gs>
+          </a:gsLst>
+          <a:lin ang="16200000" scaled="1"/>
+        </a:gradFill>
+        <a:gradFill rotWithShape="1">
+          <a:gsLst>
+            <a:gs pos="0">
+              <a:schemeClr val="phClr">
+                <a:shade val="51000"/>
+                <a:satMod val="130000"/>
+              </a:schemeClr>
+            </a:gs>
+            <a:gs pos="80000">
+              <a:schemeClr val="phClr">
+                <a:shade val="93000"/>
+                <a:satMod val="130000"/>
+              </a:schemeClr>
+            </a:gs>
+            <a:gs pos="100000">
+              <a:schemeClr val="phClr">
+                <a:shade val="94000"/>
+                <a:satMod val="135000"/>
+              </a:schemeClr>
+            </a:gs>
+          </a:gsLst>
+          <a:lin ang="16200000" scaled="0"/>
+        </a:gradFill>
+      </a:fillStyleLst>
+      <a:lnStyleLst>
+        <a:ln w="9525" cap="flat" cmpd="sng" algn="ctr">
+          <a:solidFill>
+            <a:schemeClr val="phClr">
+              <a:shade val="95000"/>
+              <a:satMod val="105000"/>
+            </a:schemeClr>
+          </a:solidFill>
+          <a:prstDash val="solid"/>
+        </a:ln>
+        <a:ln w="25400" cap="flat" cmpd="sng" algn="ctr">
+          <a:solidFill>
+            <a:schemeClr val="phClr"/>
+          </a:solidFill>
+          <a:prstDash val="solid"/>
+        </a:ln>
+        <a:ln w="38100" cap="flat" cmpd="sng" algn="ctr">
+          <a:solidFill>
+            <a:schemeClr val="phClr"/>
+          </a:solidFill>
+          <a:prstDash val="solid"/>
+        </a:ln>
+      </a:lnStyleLst>
+      <a:effectStyleLst>
+        <a:effectStyle>
+          <a:effectLst>
+            <a:outerShdw blurRad="40000" dist="20000" dir="5400000" rotWithShape="0">
+              <a:srgbClr val="000000">
+                <a:alpha val="38000"/>
+              </a:srgbClr>
+            </a:outerShdw>
+          </a:effectLst>
+        </a:effectStyle>
+        <a:effectStyle>
+          <a:effectLst>
+            <a:outerShdw blurRad="40000" dist="23000" dir="5400000" rotWithShape="0">
+              <a:srgbClr val="000000">
+                <a:alpha val="35000"/>
+              </a:srgbClr>
+            </a:outerShdw>
+          </a:effectLst>
+        </a:effectStyle>
+        <a:effectStyle>
+          <a:effectLst>
+            <a:outerShdw blurRad="40000" dist="23000" dir="5400000" rotWithShape="0">
+              <a:srgbClr val="000000">
+                <a:alpha val="35000"/>
+              </a:srgbClr>
+            </a:outerShdw>
+          </a:effectLst>
+          <a:scene3d>
+            <a:camera prst="orthographicFront">
+              <a:rot lat="0" lon="0" rev="0"/>
+            </a:camera>
+            <a:lightRig rig="threePt" dir="t">
+              <a:rot lat="0" lon="0" rev="1200000"/>
+            </a:lightRig>
+          </a:scene3d>
+          <a:sp3d>
+            <a:bevelT w="63500" h="25400"/>
+          </a:sp3d>
+        </a:effectStyle>
+      </a:effectStyleLst>
+      <a:bgFillStyleLst>
+        <a:solidFill>
+          <a:schemeClr val="phClr"/>
+        </a:solidFill>
+        <a:gradFill rotWithShape="1">
+          <a:gsLst>
+            <a:gs pos="0">
+              <a:schemeClr val="phClr">
+                <a:tint val="40000"/>
+                <a:satMod val="350000"/>
+              </a:schemeClr>
+            </a:gs>
+            <a:gs pos="40000">
+              <a:schemeClr val="phClr">
+                <a:tint val="45000"/>
+                <a:shade val="99000"/>
+                <a:satMod val="350000"/>
+              </a:schemeClr>
+            </a:gs>
+            <a:gs pos="100000">
+              <a:schemeClr val="phClr">
+                <a:shade val="20000"/>
+                <a:satMod val="255000"/>
+              </a:schemeClr>
+            </a:gs>
+          </a:gsLst>
+          <a:path path="circle">
+            <a:fillToRect l="50000" t="-80000" r="50000" b="180000"/>
+          </a:path>
+        </a:gradFill>
+        <a:gradFill rotWithShape="1">
+          <a:gsLst>
+            <a:gs pos="0">
+              <a:schemeClr val="phClr">
+                <a:tint val="80000"/>
+                <a:satMod val="300000"/>
+              </a:schemeClr>
+            </a:gs>
+            <a:gs pos="100000">
+              <a:schemeClr val="phClr">
+                <a:shade val="30000"/>
+                <a:satMod val="200000"/>
+              </a:schemeClr>
+            </a:gs>
+          </a:gsLst>
+          <a:path path="circle">
+            <a:fillToRect l="50000" t="50000" r="50000" b="50000"/>
+          </a:path>
+        </a:gradFill>
+      </a:bgFillStyleLst>
+    </a:fmtScheme>
+  </a:themeElements>
+</a:theme>
 </file>
</xml_diff>